<commit_message>
completed DNS slide deck
</commit_message>
<xml_diff>
--- a/Presentation Materials/MVA-ApplicationsOnAzure-03.pptx
+++ b/Presentation Materials/MVA-ApplicationsOnAzure-03.pptx
@@ -5,15 +5,25 @@
     <p:sldMasterId id="2147483660" r:id="rId4"/>
   </p:sldMasterIdLst>
   <p:notesMasterIdLst>
-    <p:notesMasterId r:id="rId8"/>
+    <p:notesMasterId r:id="rId18"/>
   </p:notesMasterIdLst>
   <p:handoutMasterIdLst>
-    <p:handoutMasterId r:id="rId9"/>
+    <p:handoutMasterId r:id="rId19"/>
   </p:handoutMasterIdLst>
   <p:sldIdLst>
     <p:sldId id="277" r:id="rId5"/>
-    <p:sldId id="278" r:id="rId6"/>
-    <p:sldId id="282" r:id="rId7"/>
+    <p:sldId id="286" r:id="rId6"/>
+    <p:sldId id="287" r:id="rId7"/>
+    <p:sldId id="278" r:id="rId8"/>
+    <p:sldId id="298" r:id="rId9"/>
+    <p:sldId id="282" r:id="rId10"/>
+    <p:sldId id="292" r:id="rId11"/>
+    <p:sldId id="293" r:id="rId12"/>
+    <p:sldId id="294" r:id="rId13"/>
+    <p:sldId id="295" r:id="rId14"/>
+    <p:sldId id="296" r:id="rId15"/>
+    <p:sldId id="301" r:id="rId16"/>
+    <p:sldId id="300" r:id="rId17"/>
   </p:sldIdLst>
   <p:sldSz cx="12192000" cy="6858000"/>
   <p:notesSz cx="6858000" cy="9144000"/>
@@ -205,7 +215,7 @@
           <a:p>
             <a:fld id="{312E7B4A-039C-48A2-9B2C-AF16AA3873D8}" type="datetimeFigureOut">
               <a:rPr lang="en-US" smtClean="0"/>
-              <a:t>10/14/2015</a:t>
+              <a:t>11/5/2015</a:t>
             </a:fld>
             <a:endParaRPr lang="en-US"/>
           </a:p>
@@ -370,7 +380,7 @@
           <a:p>
             <a:fld id="{DA005A0C-54D9-45AA-87D4-C551D08DFCE1}" type="datetimeFigureOut">
               <a:rPr lang="en-US" smtClean="0"/>
-              <a:t>10/14/2015</a:t>
+              <a:t>11/5/2015</a:t>
             </a:fld>
             <a:endParaRPr lang="en-US"/>
           </a:p>
@@ -728,6 +738,258 @@
 </p:notes>
 </file>
 
+<file path=ppt/notesSlides/notesSlide10.xml><?xml version="1.0" encoding="utf-8"?>
+<p:notes xmlns:a="http://schemas.openxmlformats.org/drawingml/2006/main" xmlns:r="http://schemas.openxmlformats.org/officeDocument/2006/relationships" xmlns:p="http://schemas.openxmlformats.org/presentationml/2006/main">
+  <p:cSld>
+    <p:spTree>
+      <p:nvGrpSpPr>
+        <p:cNvPr id="1" name=""/>
+        <p:cNvGrpSpPr/>
+        <p:nvPr/>
+      </p:nvGrpSpPr>
+      <p:grpSpPr>
+        <a:xfrm>
+          <a:off x="0" y="0"/>
+          <a:ext cx="0" cy="0"/>
+          <a:chOff x="0" y="0"/>
+          <a:chExt cx="0" cy="0"/>
+        </a:xfrm>
+      </p:grpSpPr>
+      <p:sp>
+        <p:nvSpPr>
+          <p:cNvPr id="2" name="Slide Image Placeholder 1"/>
+          <p:cNvSpPr>
+            <a:spLocks noGrp="1" noRot="1" noChangeAspect="1"/>
+          </p:cNvSpPr>
+          <p:nvPr>
+            <p:ph type="sldImg"/>
+          </p:nvPr>
+        </p:nvSpPr>
+        <p:spPr/>
+      </p:sp>
+      <p:sp>
+        <p:nvSpPr>
+          <p:cNvPr id="3" name="Notes Placeholder 2"/>
+          <p:cNvSpPr>
+            <a:spLocks noGrp="1"/>
+          </p:cNvSpPr>
+          <p:nvPr>
+            <p:ph type="body" idx="1"/>
+          </p:nvPr>
+        </p:nvSpPr>
+        <p:spPr/>
+        <p:txBody>
+          <a:bodyPr/>
+          <a:lstStyle/>
+          <a:p>
+            <a:endParaRPr lang="en-US"/>
+          </a:p>
+        </p:txBody>
+      </p:sp>
+      <p:sp>
+        <p:nvSpPr>
+          <p:cNvPr id="4" name="Slide Number Placeholder 3"/>
+          <p:cNvSpPr>
+            <a:spLocks noGrp="1"/>
+          </p:cNvSpPr>
+          <p:nvPr>
+            <p:ph type="sldNum" sz="quarter" idx="10"/>
+          </p:nvPr>
+        </p:nvSpPr>
+        <p:spPr/>
+        <p:txBody>
+          <a:bodyPr/>
+          <a:lstStyle/>
+          <a:p>
+            <a:fld id="{4CFD207A-07DF-40AD-A916-9872E089CE7A}" type="slidenum">
+              <a:rPr lang="en-US" smtClean="0"/>
+              <a:t>10</a:t>
+            </a:fld>
+            <a:endParaRPr lang="en-US"/>
+          </a:p>
+        </p:txBody>
+      </p:sp>
+    </p:spTree>
+    <p:extLst>
+      <p:ext uri="{BB962C8B-B14F-4D97-AF65-F5344CB8AC3E}">
+        <p14:creationId xmlns:p14="http://schemas.microsoft.com/office/powerpoint/2010/main" val="3519870286"/>
+      </p:ext>
+    </p:extLst>
+  </p:cSld>
+  <p:clrMapOvr>
+    <a:masterClrMapping/>
+  </p:clrMapOvr>
+</p:notes>
+</file>
+
+<file path=ppt/notesSlides/notesSlide11.xml><?xml version="1.0" encoding="utf-8"?>
+<p:notes xmlns:a="http://schemas.openxmlformats.org/drawingml/2006/main" xmlns:r="http://schemas.openxmlformats.org/officeDocument/2006/relationships" xmlns:p="http://schemas.openxmlformats.org/presentationml/2006/main">
+  <p:cSld>
+    <p:spTree>
+      <p:nvGrpSpPr>
+        <p:cNvPr id="1" name=""/>
+        <p:cNvGrpSpPr/>
+        <p:nvPr/>
+      </p:nvGrpSpPr>
+      <p:grpSpPr>
+        <a:xfrm>
+          <a:off x="0" y="0"/>
+          <a:ext cx="0" cy="0"/>
+          <a:chOff x="0" y="0"/>
+          <a:chExt cx="0" cy="0"/>
+        </a:xfrm>
+      </p:grpSpPr>
+      <p:sp>
+        <p:nvSpPr>
+          <p:cNvPr id="2" name="Slide Image Placeholder 1"/>
+          <p:cNvSpPr>
+            <a:spLocks noGrp="1" noRot="1" noChangeAspect="1"/>
+          </p:cNvSpPr>
+          <p:nvPr>
+            <p:ph type="sldImg"/>
+          </p:nvPr>
+        </p:nvSpPr>
+        <p:spPr/>
+      </p:sp>
+      <p:sp>
+        <p:nvSpPr>
+          <p:cNvPr id="3" name="Notes Placeholder 2"/>
+          <p:cNvSpPr>
+            <a:spLocks noGrp="1"/>
+          </p:cNvSpPr>
+          <p:nvPr>
+            <p:ph type="body" idx="1"/>
+          </p:nvPr>
+        </p:nvSpPr>
+        <p:spPr/>
+        <p:txBody>
+          <a:bodyPr/>
+          <a:lstStyle/>
+          <a:p>
+            <a:endParaRPr lang="en-US"/>
+          </a:p>
+        </p:txBody>
+      </p:sp>
+      <p:sp>
+        <p:nvSpPr>
+          <p:cNvPr id="4" name="Slide Number Placeholder 3"/>
+          <p:cNvSpPr>
+            <a:spLocks noGrp="1"/>
+          </p:cNvSpPr>
+          <p:nvPr>
+            <p:ph type="sldNum" sz="quarter" idx="10"/>
+          </p:nvPr>
+        </p:nvSpPr>
+        <p:spPr/>
+        <p:txBody>
+          <a:bodyPr/>
+          <a:lstStyle/>
+          <a:p>
+            <a:fld id="{4CFD207A-07DF-40AD-A916-9872E089CE7A}" type="slidenum">
+              <a:rPr lang="en-US" smtClean="0"/>
+              <a:t>11</a:t>
+            </a:fld>
+            <a:endParaRPr lang="en-US"/>
+          </a:p>
+        </p:txBody>
+      </p:sp>
+    </p:spTree>
+    <p:extLst>
+      <p:ext uri="{BB962C8B-B14F-4D97-AF65-F5344CB8AC3E}">
+        <p14:creationId xmlns:p14="http://schemas.microsoft.com/office/powerpoint/2010/main" val="1368975975"/>
+      </p:ext>
+    </p:extLst>
+  </p:cSld>
+  <p:clrMapOvr>
+    <a:masterClrMapping/>
+  </p:clrMapOvr>
+</p:notes>
+</file>
+
+<file path=ppt/notesSlides/notesSlide12.xml><?xml version="1.0" encoding="utf-8"?>
+<p:notes xmlns:a="http://schemas.openxmlformats.org/drawingml/2006/main" xmlns:r="http://schemas.openxmlformats.org/officeDocument/2006/relationships" xmlns:p="http://schemas.openxmlformats.org/presentationml/2006/main">
+  <p:cSld>
+    <p:spTree>
+      <p:nvGrpSpPr>
+        <p:cNvPr id="1" name=""/>
+        <p:cNvGrpSpPr/>
+        <p:nvPr/>
+      </p:nvGrpSpPr>
+      <p:grpSpPr>
+        <a:xfrm>
+          <a:off x="0" y="0"/>
+          <a:ext cx="0" cy="0"/>
+          <a:chOff x="0" y="0"/>
+          <a:chExt cx="0" cy="0"/>
+        </a:xfrm>
+      </p:grpSpPr>
+      <p:sp>
+        <p:nvSpPr>
+          <p:cNvPr id="2" name="Slide Image Placeholder 1"/>
+          <p:cNvSpPr>
+            <a:spLocks noGrp="1" noRot="1" noChangeAspect="1"/>
+          </p:cNvSpPr>
+          <p:nvPr>
+            <p:ph type="sldImg"/>
+          </p:nvPr>
+        </p:nvSpPr>
+        <p:spPr/>
+      </p:sp>
+      <p:sp>
+        <p:nvSpPr>
+          <p:cNvPr id="3" name="Notes Placeholder 2"/>
+          <p:cNvSpPr>
+            <a:spLocks noGrp="1"/>
+          </p:cNvSpPr>
+          <p:nvPr>
+            <p:ph type="body" idx="1"/>
+          </p:nvPr>
+        </p:nvSpPr>
+        <p:spPr/>
+        <p:txBody>
+          <a:bodyPr/>
+          <a:lstStyle/>
+          <a:p>
+            <a:endParaRPr lang="en-US" dirty="0"/>
+          </a:p>
+        </p:txBody>
+      </p:sp>
+      <p:sp>
+        <p:nvSpPr>
+          <p:cNvPr id="4" name="Slide Number Placeholder 3"/>
+          <p:cNvSpPr>
+            <a:spLocks noGrp="1"/>
+          </p:cNvSpPr>
+          <p:nvPr>
+            <p:ph type="sldNum" sz="quarter" idx="10"/>
+          </p:nvPr>
+        </p:nvSpPr>
+        <p:spPr/>
+        <p:txBody>
+          <a:bodyPr/>
+          <a:lstStyle/>
+          <a:p>
+            <a:fld id="{4CFD207A-07DF-40AD-A916-9872E089CE7A}" type="slidenum">
+              <a:rPr lang="en-US" smtClean="0"/>
+              <a:t>12</a:t>
+            </a:fld>
+            <a:endParaRPr lang="en-US"/>
+          </a:p>
+        </p:txBody>
+      </p:sp>
+    </p:spTree>
+    <p:extLst>
+      <p:ext uri="{BB962C8B-B14F-4D97-AF65-F5344CB8AC3E}">
+        <p14:creationId xmlns:p14="http://schemas.microsoft.com/office/powerpoint/2010/main" val="3112853090"/>
+      </p:ext>
+    </p:extLst>
+  </p:cSld>
+  <p:clrMapOvr>
+    <a:masterClrMapping/>
+  </p:clrMapOvr>
+</p:notes>
+</file>
+
 <file path=ppt/notesSlides/notesSlide2.xml><?xml version="1.0" encoding="utf-8"?>
 <p:notes xmlns:a="http://schemas.openxmlformats.org/drawingml/2006/main" xmlns:r="http://schemas.openxmlformats.org/officeDocument/2006/relationships" xmlns:p="http://schemas.openxmlformats.org/presentationml/2006/main">
   <p:cSld>
@@ -769,17 +1031,10 @@
         </p:nvSpPr>
         <p:spPr/>
         <p:txBody>
-          <a:bodyPr>
-            <a:noAutofit/>
-          </a:bodyPr>
+          <a:bodyPr/>
           <a:lstStyle/>
           <a:p>
-            <a:endParaRPr lang="en-GB" dirty="0">
-              <a:solidFill>
-                <a:schemeClr val="tx2"/>
-              </a:solidFill>
-              <a:latin typeface="Segoe" pitchFamily="34" charset="0"/>
-            </a:endParaRPr>
+            <a:endParaRPr lang="en-US" dirty="0"/>
           </a:p>
         </p:txBody>
       </p:sp>
@@ -810,7 +1065,7 @@
     </p:spTree>
     <p:extLst>
       <p:ext uri="{BB962C8B-B14F-4D97-AF65-F5344CB8AC3E}">
-        <p14:creationId xmlns:p14="http://schemas.microsoft.com/office/powerpoint/2010/main" val="1542757562"/>
+        <p14:creationId xmlns:p14="http://schemas.microsoft.com/office/powerpoint/2010/main" val="725872941"/>
       </p:ext>
     </p:extLst>
   </p:cSld>
@@ -864,7 +1119,7 @@
           <a:bodyPr/>
           <a:lstStyle/>
           <a:p>
-            <a:endParaRPr lang="en-US"/>
+            <a:endParaRPr lang="en-US" dirty="0"/>
           </a:p>
         </p:txBody>
       </p:sp>
@@ -883,9 +1138,321 @@
           <a:bodyPr/>
           <a:lstStyle/>
           <a:p>
+            <a:fld id="{13F0F35F-DD44-4607-AEC1-49D7A4BC4066}" type="slidenum">
+              <a:rPr lang="en-US" smtClean="0"/>
+              <a:pPr/>
+              <a:t>3</a:t>
+            </a:fld>
+            <a:endParaRPr lang="en-US" dirty="0"/>
+          </a:p>
+        </p:txBody>
+      </p:sp>
+    </p:spTree>
+    <p:extLst>
+      <p:ext uri="{BB962C8B-B14F-4D97-AF65-F5344CB8AC3E}">
+        <p14:creationId xmlns:p14="http://schemas.microsoft.com/office/powerpoint/2010/main" val="1844136346"/>
+      </p:ext>
+    </p:extLst>
+  </p:cSld>
+  <p:clrMapOvr>
+    <a:masterClrMapping/>
+  </p:clrMapOvr>
+</p:notes>
+</file>
+
+<file path=ppt/notesSlides/notesSlide4.xml><?xml version="1.0" encoding="utf-8"?>
+<p:notes xmlns:a="http://schemas.openxmlformats.org/drawingml/2006/main" xmlns:r="http://schemas.openxmlformats.org/officeDocument/2006/relationships" xmlns:p="http://schemas.openxmlformats.org/presentationml/2006/main">
+  <p:cSld>
+    <p:spTree>
+      <p:nvGrpSpPr>
+        <p:cNvPr id="1" name=""/>
+        <p:cNvGrpSpPr/>
+        <p:nvPr/>
+      </p:nvGrpSpPr>
+      <p:grpSpPr>
+        <a:xfrm>
+          <a:off x="0" y="0"/>
+          <a:ext cx="0" cy="0"/>
+          <a:chOff x="0" y="0"/>
+          <a:chExt cx="0" cy="0"/>
+        </a:xfrm>
+      </p:grpSpPr>
+      <p:sp>
+        <p:nvSpPr>
+          <p:cNvPr id="2" name="Slide Image Placeholder 1"/>
+          <p:cNvSpPr>
+            <a:spLocks noGrp="1" noRot="1" noChangeAspect="1"/>
+          </p:cNvSpPr>
+          <p:nvPr>
+            <p:ph type="sldImg"/>
+          </p:nvPr>
+        </p:nvSpPr>
+        <p:spPr/>
+      </p:sp>
+      <p:sp>
+        <p:nvSpPr>
+          <p:cNvPr id="3" name="Notes Placeholder 2"/>
+          <p:cNvSpPr>
+            <a:spLocks noGrp="1"/>
+          </p:cNvSpPr>
+          <p:nvPr>
+            <p:ph type="body" idx="1"/>
+          </p:nvPr>
+        </p:nvSpPr>
+        <p:spPr/>
+        <p:txBody>
+          <a:bodyPr>
+            <a:noAutofit/>
+          </a:bodyPr>
+          <a:lstStyle/>
+          <a:p>
+            <a:endParaRPr lang="en-GB" dirty="0">
+              <a:solidFill>
+                <a:schemeClr val="tx2"/>
+              </a:solidFill>
+              <a:latin typeface="Segoe" pitchFamily="34" charset="0"/>
+            </a:endParaRPr>
+          </a:p>
+        </p:txBody>
+      </p:sp>
+      <p:sp>
+        <p:nvSpPr>
+          <p:cNvPr id="4" name="Slide Number Placeholder 3"/>
+          <p:cNvSpPr>
+            <a:spLocks noGrp="1"/>
+          </p:cNvSpPr>
+          <p:nvPr>
+            <p:ph type="sldNum" sz="quarter" idx="10"/>
+          </p:nvPr>
+        </p:nvSpPr>
+        <p:spPr/>
+        <p:txBody>
+          <a:bodyPr/>
+          <a:lstStyle/>
+          <a:p>
+            <a:fld id="{13F0F35F-DD44-4607-AEC1-49D7A4BC4066}" type="slidenum">
+              <a:rPr lang="en-US" smtClean="0"/>
+              <a:pPr/>
+              <a:t>4</a:t>
+            </a:fld>
+            <a:endParaRPr lang="en-US" dirty="0"/>
+          </a:p>
+        </p:txBody>
+      </p:sp>
+    </p:spTree>
+    <p:extLst>
+      <p:ext uri="{BB962C8B-B14F-4D97-AF65-F5344CB8AC3E}">
+        <p14:creationId xmlns:p14="http://schemas.microsoft.com/office/powerpoint/2010/main" val="1542757562"/>
+      </p:ext>
+    </p:extLst>
+  </p:cSld>
+  <p:clrMapOvr>
+    <a:masterClrMapping/>
+  </p:clrMapOvr>
+</p:notes>
+</file>
+
+<file path=ppt/notesSlides/notesSlide5.xml><?xml version="1.0" encoding="utf-8"?>
+<p:notes xmlns:a="http://schemas.openxmlformats.org/drawingml/2006/main" xmlns:r="http://schemas.openxmlformats.org/officeDocument/2006/relationships" xmlns:p="http://schemas.openxmlformats.org/presentationml/2006/main">
+  <p:cSld>
+    <p:spTree>
+      <p:nvGrpSpPr>
+        <p:cNvPr id="1" name=""/>
+        <p:cNvGrpSpPr/>
+        <p:nvPr/>
+      </p:nvGrpSpPr>
+      <p:grpSpPr>
+        <a:xfrm>
+          <a:off x="0" y="0"/>
+          <a:ext cx="0" cy="0"/>
+          <a:chOff x="0" y="0"/>
+          <a:chExt cx="0" cy="0"/>
+        </a:xfrm>
+      </p:grpSpPr>
+      <p:sp>
+        <p:nvSpPr>
+          <p:cNvPr id="2" name="Slide Image Placeholder 1"/>
+          <p:cNvSpPr>
+            <a:spLocks noGrp="1" noRot="1" noChangeAspect="1"/>
+          </p:cNvSpPr>
+          <p:nvPr>
+            <p:ph type="sldImg"/>
+          </p:nvPr>
+        </p:nvSpPr>
+        <p:spPr/>
+      </p:sp>
+      <p:sp>
+        <p:nvSpPr>
+          <p:cNvPr id="3" name="Notes Placeholder 2"/>
+          <p:cNvSpPr>
+            <a:spLocks noGrp="1"/>
+          </p:cNvSpPr>
+          <p:nvPr>
+            <p:ph type="body" idx="1"/>
+          </p:nvPr>
+        </p:nvSpPr>
+        <p:spPr/>
+        <p:txBody>
+          <a:bodyPr/>
+          <a:lstStyle/>
+          <a:p>
+            <a:endParaRPr lang="en-US" dirty="0"/>
+          </a:p>
+        </p:txBody>
+      </p:sp>
+      <p:sp>
+        <p:nvSpPr>
+          <p:cNvPr id="4" name="Slide Number Placeholder 3"/>
+          <p:cNvSpPr>
+            <a:spLocks noGrp="1"/>
+          </p:cNvSpPr>
+          <p:nvPr>
+            <p:ph type="sldNum" sz="quarter" idx="10"/>
+          </p:nvPr>
+        </p:nvSpPr>
+        <p:spPr/>
+        <p:txBody>
+          <a:bodyPr/>
+          <a:lstStyle/>
+          <a:p>
             <a:fld id="{4CFD207A-07DF-40AD-A916-9872E089CE7A}" type="slidenum">
               <a:rPr lang="en-US" smtClean="0"/>
-              <a:t>3</a:t>
+              <a:t>5</a:t>
+            </a:fld>
+            <a:endParaRPr lang="en-US"/>
+          </a:p>
+        </p:txBody>
+      </p:sp>
+    </p:spTree>
+    <p:extLst>
+      <p:ext uri="{BB962C8B-B14F-4D97-AF65-F5344CB8AC3E}">
+        <p14:creationId xmlns:p14="http://schemas.microsoft.com/office/powerpoint/2010/main" val="3145615813"/>
+      </p:ext>
+    </p:extLst>
+  </p:cSld>
+  <p:clrMapOvr>
+    <a:masterClrMapping/>
+  </p:clrMapOvr>
+</p:notes>
+</file>
+
+<file path=ppt/notesSlides/notesSlide6.xml><?xml version="1.0" encoding="utf-8"?>
+<p:notes xmlns:a="http://schemas.openxmlformats.org/drawingml/2006/main" xmlns:r="http://schemas.openxmlformats.org/officeDocument/2006/relationships" xmlns:p="http://schemas.openxmlformats.org/presentationml/2006/main">
+  <p:cSld>
+    <p:spTree>
+      <p:nvGrpSpPr>
+        <p:cNvPr id="1" name=""/>
+        <p:cNvGrpSpPr/>
+        <p:nvPr/>
+      </p:nvGrpSpPr>
+      <p:grpSpPr>
+        <a:xfrm>
+          <a:off x="0" y="0"/>
+          <a:ext cx="0" cy="0"/>
+          <a:chOff x="0" y="0"/>
+          <a:chExt cx="0" cy="0"/>
+        </a:xfrm>
+      </p:grpSpPr>
+      <p:sp>
+        <p:nvSpPr>
+          <p:cNvPr id="2" name="Slide Image Placeholder 1"/>
+          <p:cNvSpPr>
+            <a:spLocks noGrp="1" noRot="1" noChangeAspect="1"/>
+          </p:cNvSpPr>
+          <p:nvPr>
+            <p:ph type="sldImg"/>
+          </p:nvPr>
+        </p:nvSpPr>
+        <p:spPr/>
+      </p:sp>
+      <p:sp>
+        <p:nvSpPr>
+          <p:cNvPr id="3" name="Notes Placeholder 2"/>
+          <p:cNvSpPr>
+            <a:spLocks noGrp="1"/>
+          </p:cNvSpPr>
+          <p:nvPr>
+            <p:ph type="body" idx="1"/>
+          </p:nvPr>
+        </p:nvSpPr>
+        <p:spPr/>
+        <p:txBody>
+          <a:bodyPr/>
+          <a:lstStyle/>
+          <a:p>
+            <a:r>
+              <a:rPr lang="en-US" dirty="0" smtClean="0"/>
+              <a:t>Top level domain – .com,</a:t>
+            </a:r>
+            <a:r>
+              <a:rPr lang="en-US" baseline="0" dirty="0" smtClean="0"/>
+              <a:t> </a:t>
+            </a:r>
+            <a:r>
+              <a:rPr lang="en-US" baseline="0" dirty="0" err="1" smtClean="0"/>
+              <a:t>.net</a:t>
+            </a:r>
+            <a:r>
+              <a:rPr lang="en-US" baseline="0" dirty="0" smtClean="0"/>
+              <a:t>, .org, .</a:t>
+            </a:r>
+            <a:r>
+              <a:rPr lang="en-US" baseline="0" dirty="0" err="1" smtClean="0"/>
+              <a:t>edu</a:t>
+            </a:r>
+            <a:r>
+              <a:rPr lang="en-US" baseline="0" dirty="0" smtClean="0"/>
+              <a:t> </a:t>
+            </a:r>
+            <a:r>
+              <a:rPr lang="en-US" baseline="0" dirty="0" err="1" smtClean="0"/>
+              <a:t>etc</a:t>
+            </a:r>
+            <a:r>
+              <a:rPr lang="en-US" baseline="0" dirty="0" smtClean="0"/>
+              <a:t> + country codes + specials</a:t>
+            </a:r>
+            <a:endParaRPr lang="en-US" dirty="0" smtClean="0"/>
+          </a:p>
+          <a:p>
+            <a:r>
+              <a:rPr lang="en-US" dirty="0" smtClean="0"/>
+              <a:t>Second</a:t>
+            </a:r>
+            <a:r>
+              <a:rPr lang="en-US" baseline="0" dirty="0" smtClean="0"/>
+              <a:t> level domain  - involves registrars</a:t>
+            </a:r>
+          </a:p>
+          <a:p>
+            <a:r>
+              <a:rPr lang="en-US" baseline="0" dirty="0" smtClean="0"/>
+              <a:t>Third level, subdomain, host name – you typically set these</a:t>
+            </a:r>
+          </a:p>
+          <a:p>
+            <a:endParaRPr lang="en-US" dirty="0"/>
+          </a:p>
+        </p:txBody>
+      </p:sp>
+      <p:sp>
+        <p:nvSpPr>
+          <p:cNvPr id="4" name="Slide Number Placeholder 3"/>
+          <p:cNvSpPr>
+            <a:spLocks noGrp="1"/>
+          </p:cNvSpPr>
+          <p:nvPr>
+            <p:ph type="sldNum" sz="quarter" idx="10"/>
+          </p:nvPr>
+        </p:nvSpPr>
+        <p:spPr/>
+        <p:txBody>
+          <a:bodyPr/>
+          <a:lstStyle/>
+          <a:p>
+            <a:fld id="{4CFD207A-07DF-40AD-A916-9872E089CE7A}" type="slidenum">
+              <a:rPr lang="en-US" smtClean="0"/>
+              <a:t>6</a:t>
             </a:fld>
             <a:endParaRPr lang="en-US"/>
           </a:p>
@@ -895,6 +1462,258 @@
     <p:extLst>
       <p:ext uri="{BB962C8B-B14F-4D97-AF65-F5344CB8AC3E}">
         <p14:creationId xmlns:p14="http://schemas.microsoft.com/office/powerpoint/2010/main" val="1692121609"/>
+      </p:ext>
+    </p:extLst>
+  </p:cSld>
+  <p:clrMapOvr>
+    <a:masterClrMapping/>
+  </p:clrMapOvr>
+</p:notes>
+</file>
+
+<file path=ppt/notesSlides/notesSlide7.xml><?xml version="1.0" encoding="utf-8"?>
+<p:notes xmlns:a="http://schemas.openxmlformats.org/drawingml/2006/main" xmlns:r="http://schemas.openxmlformats.org/officeDocument/2006/relationships" xmlns:p="http://schemas.openxmlformats.org/presentationml/2006/main">
+  <p:cSld>
+    <p:spTree>
+      <p:nvGrpSpPr>
+        <p:cNvPr id="1" name=""/>
+        <p:cNvGrpSpPr/>
+        <p:nvPr/>
+      </p:nvGrpSpPr>
+      <p:grpSpPr>
+        <a:xfrm>
+          <a:off x="0" y="0"/>
+          <a:ext cx="0" cy="0"/>
+          <a:chOff x="0" y="0"/>
+          <a:chExt cx="0" cy="0"/>
+        </a:xfrm>
+      </p:grpSpPr>
+      <p:sp>
+        <p:nvSpPr>
+          <p:cNvPr id="2" name="Slide Image Placeholder 1"/>
+          <p:cNvSpPr>
+            <a:spLocks noGrp="1" noRot="1" noChangeAspect="1"/>
+          </p:cNvSpPr>
+          <p:nvPr>
+            <p:ph type="sldImg"/>
+          </p:nvPr>
+        </p:nvSpPr>
+        <p:spPr/>
+      </p:sp>
+      <p:sp>
+        <p:nvSpPr>
+          <p:cNvPr id="3" name="Notes Placeholder 2"/>
+          <p:cNvSpPr>
+            <a:spLocks noGrp="1"/>
+          </p:cNvSpPr>
+          <p:nvPr>
+            <p:ph type="body" idx="1"/>
+          </p:nvPr>
+        </p:nvSpPr>
+        <p:spPr/>
+        <p:txBody>
+          <a:bodyPr/>
+          <a:lstStyle/>
+          <a:p>
+            <a:endParaRPr lang="en-US"/>
+          </a:p>
+        </p:txBody>
+      </p:sp>
+      <p:sp>
+        <p:nvSpPr>
+          <p:cNvPr id="4" name="Slide Number Placeholder 3"/>
+          <p:cNvSpPr>
+            <a:spLocks noGrp="1"/>
+          </p:cNvSpPr>
+          <p:nvPr>
+            <p:ph type="sldNum" sz="quarter" idx="10"/>
+          </p:nvPr>
+        </p:nvSpPr>
+        <p:spPr/>
+        <p:txBody>
+          <a:bodyPr/>
+          <a:lstStyle/>
+          <a:p>
+            <a:fld id="{4CFD207A-07DF-40AD-A916-9872E089CE7A}" type="slidenum">
+              <a:rPr lang="en-US" smtClean="0"/>
+              <a:t>7</a:t>
+            </a:fld>
+            <a:endParaRPr lang="en-US"/>
+          </a:p>
+        </p:txBody>
+      </p:sp>
+    </p:spTree>
+    <p:extLst>
+      <p:ext uri="{BB962C8B-B14F-4D97-AF65-F5344CB8AC3E}">
+        <p14:creationId xmlns:p14="http://schemas.microsoft.com/office/powerpoint/2010/main" val="3219556323"/>
+      </p:ext>
+    </p:extLst>
+  </p:cSld>
+  <p:clrMapOvr>
+    <a:masterClrMapping/>
+  </p:clrMapOvr>
+</p:notes>
+</file>
+
+<file path=ppt/notesSlides/notesSlide8.xml><?xml version="1.0" encoding="utf-8"?>
+<p:notes xmlns:a="http://schemas.openxmlformats.org/drawingml/2006/main" xmlns:r="http://schemas.openxmlformats.org/officeDocument/2006/relationships" xmlns:p="http://schemas.openxmlformats.org/presentationml/2006/main">
+  <p:cSld>
+    <p:spTree>
+      <p:nvGrpSpPr>
+        <p:cNvPr id="1" name=""/>
+        <p:cNvGrpSpPr/>
+        <p:nvPr/>
+      </p:nvGrpSpPr>
+      <p:grpSpPr>
+        <a:xfrm>
+          <a:off x="0" y="0"/>
+          <a:ext cx="0" cy="0"/>
+          <a:chOff x="0" y="0"/>
+          <a:chExt cx="0" cy="0"/>
+        </a:xfrm>
+      </p:grpSpPr>
+      <p:sp>
+        <p:nvSpPr>
+          <p:cNvPr id="2" name="Slide Image Placeholder 1"/>
+          <p:cNvSpPr>
+            <a:spLocks noGrp="1" noRot="1" noChangeAspect="1"/>
+          </p:cNvSpPr>
+          <p:nvPr>
+            <p:ph type="sldImg"/>
+          </p:nvPr>
+        </p:nvSpPr>
+        <p:spPr/>
+      </p:sp>
+      <p:sp>
+        <p:nvSpPr>
+          <p:cNvPr id="3" name="Notes Placeholder 2"/>
+          <p:cNvSpPr>
+            <a:spLocks noGrp="1"/>
+          </p:cNvSpPr>
+          <p:nvPr>
+            <p:ph type="body" idx="1"/>
+          </p:nvPr>
+        </p:nvSpPr>
+        <p:spPr/>
+        <p:txBody>
+          <a:bodyPr/>
+          <a:lstStyle/>
+          <a:p>
+            <a:endParaRPr lang="en-US"/>
+          </a:p>
+        </p:txBody>
+      </p:sp>
+      <p:sp>
+        <p:nvSpPr>
+          <p:cNvPr id="4" name="Slide Number Placeholder 3"/>
+          <p:cNvSpPr>
+            <a:spLocks noGrp="1"/>
+          </p:cNvSpPr>
+          <p:nvPr>
+            <p:ph type="sldNum" sz="quarter" idx="10"/>
+          </p:nvPr>
+        </p:nvSpPr>
+        <p:spPr/>
+        <p:txBody>
+          <a:bodyPr/>
+          <a:lstStyle/>
+          <a:p>
+            <a:fld id="{4CFD207A-07DF-40AD-A916-9872E089CE7A}" type="slidenum">
+              <a:rPr lang="en-US" smtClean="0"/>
+              <a:t>8</a:t>
+            </a:fld>
+            <a:endParaRPr lang="en-US"/>
+          </a:p>
+        </p:txBody>
+      </p:sp>
+    </p:spTree>
+    <p:extLst>
+      <p:ext uri="{BB962C8B-B14F-4D97-AF65-F5344CB8AC3E}">
+        <p14:creationId xmlns:p14="http://schemas.microsoft.com/office/powerpoint/2010/main" val="939188392"/>
+      </p:ext>
+    </p:extLst>
+  </p:cSld>
+  <p:clrMapOvr>
+    <a:masterClrMapping/>
+  </p:clrMapOvr>
+</p:notes>
+</file>
+
+<file path=ppt/notesSlides/notesSlide9.xml><?xml version="1.0" encoding="utf-8"?>
+<p:notes xmlns:a="http://schemas.openxmlformats.org/drawingml/2006/main" xmlns:r="http://schemas.openxmlformats.org/officeDocument/2006/relationships" xmlns:p="http://schemas.openxmlformats.org/presentationml/2006/main">
+  <p:cSld>
+    <p:spTree>
+      <p:nvGrpSpPr>
+        <p:cNvPr id="1" name=""/>
+        <p:cNvGrpSpPr/>
+        <p:nvPr/>
+      </p:nvGrpSpPr>
+      <p:grpSpPr>
+        <a:xfrm>
+          <a:off x="0" y="0"/>
+          <a:ext cx="0" cy="0"/>
+          <a:chOff x="0" y="0"/>
+          <a:chExt cx="0" cy="0"/>
+        </a:xfrm>
+      </p:grpSpPr>
+      <p:sp>
+        <p:nvSpPr>
+          <p:cNvPr id="2" name="Slide Image Placeholder 1"/>
+          <p:cNvSpPr>
+            <a:spLocks noGrp="1" noRot="1" noChangeAspect="1"/>
+          </p:cNvSpPr>
+          <p:nvPr>
+            <p:ph type="sldImg"/>
+          </p:nvPr>
+        </p:nvSpPr>
+        <p:spPr/>
+      </p:sp>
+      <p:sp>
+        <p:nvSpPr>
+          <p:cNvPr id="3" name="Notes Placeholder 2"/>
+          <p:cNvSpPr>
+            <a:spLocks noGrp="1"/>
+          </p:cNvSpPr>
+          <p:nvPr>
+            <p:ph type="body" idx="1"/>
+          </p:nvPr>
+        </p:nvSpPr>
+        <p:spPr/>
+        <p:txBody>
+          <a:bodyPr/>
+          <a:lstStyle/>
+          <a:p>
+            <a:endParaRPr lang="en-US"/>
+          </a:p>
+        </p:txBody>
+      </p:sp>
+      <p:sp>
+        <p:nvSpPr>
+          <p:cNvPr id="4" name="Slide Number Placeholder 3"/>
+          <p:cNvSpPr>
+            <a:spLocks noGrp="1"/>
+          </p:cNvSpPr>
+          <p:nvPr>
+            <p:ph type="sldNum" sz="quarter" idx="10"/>
+          </p:nvPr>
+        </p:nvSpPr>
+        <p:spPr/>
+        <p:txBody>
+          <a:bodyPr/>
+          <a:lstStyle/>
+          <a:p>
+            <a:fld id="{4CFD207A-07DF-40AD-A916-9872E089CE7A}" type="slidenum">
+              <a:rPr lang="en-US" smtClean="0"/>
+              <a:t>9</a:t>
+            </a:fld>
+            <a:endParaRPr lang="en-US"/>
+          </a:p>
+        </p:txBody>
+      </p:sp>
+    </p:spTree>
+    <p:extLst>
+      <p:ext uri="{BB962C8B-B14F-4D97-AF65-F5344CB8AC3E}">
+        <p14:creationId xmlns:p14="http://schemas.microsoft.com/office/powerpoint/2010/main" val="433051261"/>
       </p:ext>
     </p:extLst>
   </p:cSld>
@@ -3748,6 +4567,989 @@
 </p:sld>
 </file>
 
+<file path=ppt/slides/slide10.xml><?xml version="1.0" encoding="utf-8"?>
+<p:sld xmlns:a="http://schemas.openxmlformats.org/drawingml/2006/main" xmlns:r="http://schemas.openxmlformats.org/officeDocument/2006/relationships" xmlns:p="http://schemas.openxmlformats.org/presentationml/2006/main">
+  <p:cSld>
+    <p:spTree>
+      <p:nvGrpSpPr>
+        <p:cNvPr id="1" name=""/>
+        <p:cNvGrpSpPr/>
+        <p:nvPr/>
+      </p:nvGrpSpPr>
+      <p:grpSpPr>
+        <a:xfrm>
+          <a:off x="0" y="0"/>
+          <a:ext cx="0" cy="0"/>
+          <a:chOff x="0" y="0"/>
+          <a:chExt cx="0" cy="0"/>
+        </a:xfrm>
+      </p:grpSpPr>
+      <p:sp>
+        <p:nvSpPr>
+          <p:cNvPr id="2" name="Title 1"/>
+          <p:cNvSpPr>
+            <a:spLocks noGrp="1"/>
+          </p:cNvSpPr>
+          <p:nvPr>
+            <p:ph type="title"/>
+          </p:nvPr>
+        </p:nvSpPr>
+        <p:spPr/>
+        <p:txBody>
+          <a:bodyPr/>
+          <a:lstStyle/>
+          <a:p>
+            <a:r>
+              <a:rPr lang="en-US" dirty="0" smtClean="0"/>
+              <a:t>DNS Entries</a:t>
+            </a:r>
+            <a:endParaRPr lang="en-US" dirty="0"/>
+          </a:p>
+        </p:txBody>
+      </p:sp>
+      <p:sp>
+        <p:nvSpPr>
+          <p:cNvPr id="4" name="TextBox 3"/>
+          <p:cNvSpPr txBox="1"/>
+          <p:nvPr/>
+        </p:nvSpPr>
+        <p:spPr>
+          <a:xfrm>
+            <a:off x="9906000" y="-1"/>
+            <a:ext cx="2286000" cy="2031325"/>
+          </a:xfrm>
+          <a:prstGeom prst="rect">
+            <a:avLst/>
+          </a:prstGeom>
+          <a:solidFill>
+            <a:srgbClr val="FFFF00"/>
+          </a:solidFill>
+          <a:ln>
+            <a:noFill/>
+          </a:ln>
+        </p:spPr>
+        <p:txBody>
+          <a:bodyPr wrap="square" rtlCol="0">
+            <a:spAutoFit/>
+          </a:bodyPr>
+          <a:lstStyle/>
+          <a:p>
+            <a:pPr algn="ctr"/>
+            <a:endParaRPr lang="en-US" dirty="0" smtClean="0"/>
+          </a:p>
+          <a:p>
+            <a:pPr algn="ctr"/>
+            <a:endParaRPr lang="en-US" dirty="0"/>
+          </a:p>
+          <a:p>
+            <a:pPr algn="ctr"/>
+            <a:r>
+              <a:rPr lang="en-US" dirty="0" smtClean="0"/>
+              <a:t>Please leave this area blank to allow for picture in picture recording</a:t>
+            </a:r>
+          </a:p>
+          <a:p>
+            <a:pPr algn="ctr"/>
+            <a:endParaRPr lang="en-US" dirty="0"/>
+          </a:p>
+        </p:txBody>
+      </p:sp>
+      <p:pic>
+        <p:nvPicPr>
+          <p:cNvPr id="3" name="Picture 2"/>
+          <p:cNvPicPr>
+            <a:picLocks noChangeAspect="1"/>
+          </p:cNvPicPr>
+          <p:nvPr/>
+        </p:nvPicPr>
+        <p:blipFill>
+          <a:blip r:embed="rId3"/>
+          <a:stretch>
+            <a:fillRect/>
+          </a:stretch>
+        </p:blipFill>
+        <p:spPr>
+          <a:xfrm>
+            <a:off x="1909535" y="1245702"/>
+            <a:ext cx="7124700" cy="4010025"/>
+          </a:xfrm>
+          <a:prstGeom prst="rect">
+            <a:avLst/>
+          </a:prstGeom>
+        </p:spPr>
+      </p:pic>
+    </p:spTree>
+    <p:extLst>
+      <p:ext uri="{BB962C8B-B14F-4D97-AF65-F5344CB8AC3E}">
+        <p14:creationId xmlns:p14="http://schemas.microsoft.com/office/powerpoint/2010/main" val="3989168018"/>
+      </p:ext>
+    </p:extLst>
+  </p:cSld>
+  <p:clrMapOvr>
+    <a:masterClrMapping/>
+  </p:clrMapOvr>
+  <p:timing>
+    <p:tnLst>
+      <p:par>
+        <p:cTn id="1" dur="indefinite" restart="never" nodeType="tmRoot"/>
+      </p:par>
+    </p:tnLst>
+  </p:timing>
+</p:sld>
+</file>
+
+<file path=ppt/slides/slide11.xml><?xml version="1.0" encoding="utf-8"?>
+<p:sld xmlns:a="http://schemas.openxmlformats.org/drawingml/2006/main" xmlns:r="http://schemas.openxmlformats.org/officeDocument/2006/relationships" xmlns:p="http://schemas.openxmlformats.org/presentationml/2006/main">
+  <p:cSld>
+    <p:spTree>
+      <p:nvGrpSpPr>
+        <p:cNvPr id="1" name=""/>
+        <p:cNvGrpSpPr/>
+        <p:nvPr/>
+      </p:nvGrpSpPr>
+      <p:grpSpPr>
+        <a:xfrm>
+          <a:off x="0" y="0"/>
+          <a:ext cx="0" cy="0"/>
+          <a:chOff x="0" y="0"/>
+          <a:chExt cx="0" cy="0"/>
+        </a:xfrm>
+      </p:grpSpPr>
+      <p:sp>
+        <p:nvSpPr>
+          <p:cNvPr id="2" name="Title 1"/>
+          <p:cNvSpPr>
+            <a:spLocks noGrp="1"/>
+          </p:cNvSpPr>
+          <p:nvPr>
+            <p:ph type="title"/>
+          </p:nvPr>
+        </p:nvSpPr>
+        <p:spPr/>
+        <p:txBody>
+          <a:bodyPr/>
+          <a:lstStyle/>
+          <a:p>
+            <a:r>
+              <a:rPr lang="en-US" dirty="0" smtClean="0"/>
+              <a:t>Considerations</a:t>
+            </a:r>
+            <a:endParaRPr lang="en-US" dirty="0"/>
+          </a:p>
+        </p:txBody>
+      </p:sp>
+      <p:sp>
+        <p:nvSpPr>
+          <p:cNvPr id="4" name="TextBox 3"/>
+          <p:cNvSpPr txBox="1"/>
+          <p:nvPr/>
+        </p:nvSpPr>
+        <p:spPr>
+          <a:xfrm>
+            <a:off x="9906000" y="-1"/>
+            <a:ext cx="2286000" cy="2031325"/>
+          </a:xfrm>
+          <a:prstGeom prst="rect">
+            <a:avLst/>
+          </a:prstGeom>
+          <a:solidFill>
+            <a:srgbClr val="FFFF00"/>
+          </a:solidFill>
+          <a:ln>
+            <a:noFill/>
+          </a:ln>
+        </p:spPr>
+        <p:txBody>
+          <a:bodyPr wrap="square" rtlCol="0">
+            <a:spAutoFit/>
+          </a:bodyPr>
+          <a:lstStyle/>
+          <a:p>
+            <a:pPr algn="ctr"/>
+            <a:endParaRPr lang="en-US" dirty="0" smtClean="0"/>
+          </a:p>
+          <a:p>
+            <a:pPr algn="ctr"/>
+            <a:endParaRPr lang="en-US" dirty="0"/>
+          </a:p>
+          <a:p>
+            <a:pPr algn="ctr"/>
+            <a:r>
+              <a:rPr lang="en-US" dirty="0" smtClean="0"/>
+              <a:t>Please leave this area blank to allow for picture in picture recording</a:t>
+            </a:r>
+          </a:p>
+          <a:p>
+            <a:pPr algn="ctr"/>
+            <a:endParaRPr lang="en-US" dirty="0"/>
+          </a:p>
+        </p:txBody>
+      </p:sp>
+      <p:sp>
+        <p:nvSpPr>
+          <p:cNvPr id="5" name="Content Placeholder 6"/>
+          <p:cNvSpPr>
+            <a:spLocks noGrp="1"/>
+          </p:cNvSpPr>
+          <p:nvPr>
+            <p:ph sz="quarter" idx="10"/>
+          </p:nvPr>
+        </p:nvSpPr>
+        <p:spPr>
+          <a:xfrm>
+            <a:off x="379413" y="1388226"/>
+            <a:ext cx="11525250" cy="5290388"/>
+          </a:xfrm>
+        </p:spPr>
+        <p:txBody>
+          <a:bodyPr>
+            <a:normAutofit/>
+          </a:bodyPr>
+          <a:lstStyle/>
+          <a:p>
+            <a:r>
+              <a:rPr lang="en-GB" dirty="0" smtClean="0"/>
+              <a:t>Services simplify DNS concerns and management</a:t>
+            </a:r>
+          </a:p>
+          <a:p>
+            <a:r>
+              <a:rPr lang="en-GB" dirty="0" smtClean="0"/>
+              <a:t>Caching can have an impact on record resolution</a:t>
+            </a:r>
+          </a:p>
+          <a:p>
+            <a:r>
+              <a:rPr lang="en-GB" dirty="0" smtClean="0"/>
+              <a:t>You </a:t>
+            </a:r>
+            <a:r>
+              <a:rPr lang="en-GB" i="1" dirty="0" smtClean="0"/>
+              <a:t>usually</a:t>
+            </a:r>
+            <a:r>
+              <a:rPr lang="en-GB" dirty="0" smtClean="0"/>
+              <a:t> don’t have to worry about it after setting things up</a:t>
+            </a:r>
+          </a:p>
+        </p:txBody>
+      </p:sp>
+    </p:spTree>
+    <p:extLst>
+      <p:ext uri="{BB962C8B-B14F-4D97-AF65-F5344CB8AC3E}">
+        <p14:creationId xmlns:p14="http://schemas.microsoft.com/office/powerpoint/2010/main" val="1625268019"/>
+      </p:ext>
+    </p:extLst>
+  </p:cSld>
+  <p:clrMapOvr>
+    <a:masterClrMapping/>
+  </p:clrMapOvr>
+  <p:timing>
+    <p:tnLst>
+      <p:par>
+        <p:cTn id="1" dur="indefinite" restart="never" nodeType="tmRoot">
+          <p:childTnLst>
+            <p:seq concurrent="1" nextAc="seek">
+              <p:cTn id="2" dur="indefinite" nodeType="mainSeq">
+                <p:childTnLst>
+                  <p:par>
+                    <p:cTn id="3" fill="hold">
+                      <p:stCondLst>
+                        <p:cond delay="indefinite"/>
+                      </p:stCondLst>
+                      <p:childTnLst>
+                        <p:par>
+                          <p:cTn id="4" fill="hold">
+                            <p:stCondLst>
+                              <p:cond delay="0"/>
+                            </p:stCondLst>
+                            <p:childTnLst>
+                              <p:par>
+                                <p:cTn id="5" presetID="1" presetClass="entr" presetSubtype="0" fill="hold" nodeType="clickEffect">
+                                  <p:stCondLst>
+                                    <p:cond delay="0"/>
+                                  </p:stCondLst>
+                                  <p:childTnLst>
+                                    <p:set>
+                                      <p:cBhvr>
+                                        <p:cTn id="6" dur="1" fill="hold">
+                                          <p:stCondLst>
+                                            <p:cond delay="0"/>
+                                          </p:stCondLst>
+                                        </p:cTn>
+                                        <p:tgtEl>
+                                          <p:spTgt spid="5">
+                                            <p:txEl>
+                                              <p:pRg st="0" end="0"/>
+                                            </p:txEl>
+                                          </p:spTgt>
+                                        </p:tgtEl>
+                                        <p:attrNameLst>
+                                          <p:attrName>style.visibility</p:attrName>
+                                        </p:attrNameLst>
+                                      </p:cBhvr>
+                                      <p:to>
+                                        <p:strVal val="visible"/>
+                                      </p:to>
+                                    </p:set>
+                                  </p:childTnLst>
+                                </p:cTn>
+                              </p:par>
+                            </p:childTnLst>
+                          </p:cTn>
+                        </p:par>
+                      </p:childTnLst>
+                    </p:cTn>
+                  </p:par>
+                  <p:par>
+                    <p:cTn id="7" fill="hold">
+                      <p:stCondLst>
+                        <p:cond delay="indefinite"/>
+                      </p:stCondLst>
+                      <p:childTnLst>
+                        <p:par>
+                          <p:cTn id="8" fill="hold">
+                            <p:stCondLst>
+                              <p:cond delay="0"/>
+                            </p:stCondLst>
+                            <p:childTnLst>
+                              <p:par>
+                                <p:cTn id="9" presetID="1" presetClass="entr" presetSubtype="0" fill="hold" nodeType="clickEffect">
+                                  <p:stCondLst>
+                                    <p:cond delay="0"/>
+                                  </p:stCondLst>
+                                  <p:childTnLst>
+                                    <p:set>
+                                      <p:cBhvr>
+                                        <p:cTn id="10" dur="1" fill="hold">
+                                          <p:stCondLst>
+                                            <p:cond delay="0"/>
+                                          </p:stCondLst>
+                                        </p:cTn>
+                                        <p:tgtEl>
+                                          <p:spTgt spid="5">
+                                            <p:txEl>
+                                              <p:pRg st="1" end="1"/>
+                                            </p:txEl>
+                                          </p:spTgt>
+                                        </p:tgtEl>
+                                        <p:attrNameLst>
+                                          <p:attrName>style.visibility</p:attrName>
+                                        </p:attrNameLst>
+                                      </p:cBhvr>
+                                      <p:to>
+                                        <p:strVal val="visible"/>
+                                      </p:to>
+                                    </p:set>
+                                  </p:childTnLst>
+                                </p:cTn>
+                              </p:par>
+                            </p:childTnLst>
+                          </p:cTn>
+                        </p:par>
+                      </p:childTnLst>
+                    </p:cTn>
+                  </p:par>
+                  <p:par>
+                    <p:cTn id="11" fill="hold">
+                      <p:stCondLst>
+                        <p:cond delay="indefinite"/>
+                      </p:stCondLst>
+                      <p:childTnLst>
+                        <p:par>
+                          <p:cTn id="12" fill="hold">
+                            <p:stCondLst>
+                              <p:cond delay="0"/>
+                            </p:stCondLst>
+                            <p:childTnLst>
+                              <p:par>
+                                <p:cTn id="13" presetID="1" presetClass="entr" presetSubtype="0" fill="hold" nodeType="clickEffect">
+                                  <p:stCondLst>
+                                    <p:cond delay="0"/>
+                                  </p:stCondLst>
+                                  <p:childTnLst>
+                                    <p:set>
+                                      <p:cBhvr>
+                                        <p:cTn id="14" dur="1" fill="hold">
+                                          <p:stCondLst>
+                                            <p:cond delay="0"/>
+                                          </p:stCondLst>
+                                        </p:cTn>
+                                        <p:tgtEl>
+                                          <p:spTgt spid="5">
+                                            <p:txEl>
+                                              <p:pRg st="2" end="2"/>
+                                            </p:txEl>
+                                          </p:spTgt>
+                                        </p:tgtEl>
+                                        <p:attrNameLst>
+                                          <p:attrName>style.visibility</p:attrName>
+                                        </p:attrNameLst>
+                                      </p:cBhvr>
+                                      <p:to>
+                                        <p:strVal val="visible"/>
+                                      </p:to>
+                                    </p:set>
+                                  </p:childTnLst>
+                                </p:cTn>
+                              </p:par>
+                            </p:childTnLst>
+                          </p:cTn>
+                        </p:par>
+                      </p:childTnLst>
+                    </p:cTn>
+                  </p:par>
+                </p:childTnLst>
+              </p:cTn>
+              <p:prevCondLst>
+                <p:cond evt="onPrev" delay="0">
+                  <p:tgtEl>
+                    <p:sldTgt/>
+                  </p:tgtEl>
+                </p:cond>
+              </p:prevCondLst>
+              <p:nextCondLst>
+                <p:cond evt="onNext" delay="0">
+                  <p:tgtEl>
+                    <p:sldTgt/>
+                  </p:tgtEl>
+                </p:cond>
+              </p:nextCondLst>
+            </p:seq>
+          </p:childTnLst>
+        </p:cTn>
+      </p:par>
+    </p:tnLst>
+  </p:timing>
+</p:sld>
+</file>
+
+<file path=ppt/slides/slide12.xml><?xml version="1.0" encoding="utf-8"?>
+<p:sld xmlns:a="http://schemas.openxmlformats.org/drawingml/2006/main" xmlns:r="http://schemas.openxmlformats.org/officeDocument/2006/relationships" xmlns:p="http://schemas.openxmlformats.org/presentationml/2006/main">
+  <p:cSld>
+    <p:spTree>
+      <p:nvGrpSpPr>
+        <p:cNvPr id="1" name=""/>
+        <p:cNvGrpSpPr/>
+        <p:nvPr/>
+      </p:nvGrpSpPr>
+      <p:grpSpPr>
+        <a:xfrm>
+          <a:off x="0" y="0"/>
+          <a:ext cx="0" cy="0"/>
+          <a:chOff x="0" y="0"/>
+          <a:chExt cx="0" cy="0"/>
+        </a:xfrm>
+      </p:grpSpPr>
+      <p:sp>
+        <p:nvSpPr>
+          <p:cNvPr id="2" name="Title 1"/>
+          <p:cNvSpPr>
+            <a:spLocks noGrp="1"/>
+          </p:cNvSpPr>
+          <p:nvPr>
+            <p:ph type="title"/>
+          </p:nvPr>
+        </p:nvSpPr>
+        <p:spPr/>
+        <p:txBody>
+          <a:bodyPr/>
+          <a:lstStyle/>
+          <a:p>
+            <a:r>
+              <a:rPr lang="en-US" dirty="0" smtClean="0"/>
+              <a:t>Our Scenario</a:t>
+            </a:r>
+            <a:endParaRPr lang="en-US" dirty="0"/>
+          </a:p>
+        </p:txBody>
+      </p:sp>
+      <p:sp>
+        <p:nvSpPr>
+          <p:cNvPr id="4" name="TextBox 3"/>
+          <p:cNvSpPr txBox="1"/>
+          <p:nvPr/>
+        </p:nvSpPr>
+        <p:spPr>
+          <a:xfrm>
+            <a:off x="9906000" y="-1"/>
+            <a:ext cx="2286000" cy="2031325"/>
+          </a:xfrm>
+          <a:prstGeom prst="rect">
+            <a:avLst/>
+          </a:prstGeom>
+          <a:solidFill>
+            <a:srgbClr val="FFFF00"/>
+          </a:solidFill>
+          <a:ln>
+            <a:noFill/>
+          </a:ln>
+        </p:spPr>
+        <p:txBody>
+          <a:bodyPr wrap="square" rtlCol="0">
+            <a:spAutoFit/>
+          </a:bodyPr>
+          <a:lstStyle/>
+          <a:p>
+            <a:pPr algn="ctr"/>
+            <a:endParaRPr lang="en-US" dirty="0" smtClean="0"/>
+          </a:p>
+          <a:p>
+            <a:pPr algn="ctr"/>
+            <a:endParaRPr lang="en-US" dirty="0"/>
+          </a:p>
+          <a:p>
+            <a:pPr algn="ctr"/>
+            <a:r>
+              <a:rPr lang="en-US" dirty="0" smtClean="0"/>
+              <a:t>Please leave this area blank to allow for picture in picture recording</a:t>
+            </a:r>
+          </a:p>
+          <a:p>
+            <a:pPr algn="ctr"/>
+            <a:endParaRPr lang="en-US" dirty="0"/>
+          </a:p>
+        </p:txBody>
+      </p:sp>
+      <p:sp>
+        <p:nvSpPr>
+          <p:cNvPr id="5" name="Content Placeholder 6"/>
+          <p:cNvSpPr>
+            <a:spLocks noGrp="1"/>
+          </p:cNvSpPr>
+          <p:nvPr>
+            <p:ph sz="quarter" idx="10"/>
+          </p:nvPr>
+        </p:nvSpPr>
+        <p:spPr>
+          <a:xfrm>
+            <a:off x="379413" y="1388226"/>
+            <a:ext cx="11525250" cy="3503088"/>
+          </a:xfrm>
+        </p:spPr>
+        <p:txBody>
+          <a:bodyPr>
+            <a:normAutofit/>
+          </a:bodyPr>
+          <a:lstStyle/>
+          <a:p>
+            <a:r>
+              <a:rPr lang="en-GB" dirty="0" smtClean="0"/>
+              <a:t>Create entries for each registered user</a:t>
+            </a:r>
+          </a:p>
+          <a:p>
+            <a:r>
+              <a:rPr lang="en-GB" dirty="0" smtClean="0"/>
+              <a:t>Read our information from a queue</a:t>
+            </a:r>
+          </a:p>
+          <a:p>
+            <a:r>
+              <a:rPr lang="en-GB" dirty="0" smtClean="0"/>
+              <a:t>Process entries in a background process</a:t>
+            </a:r>
+          </a:p>
+        </p:txBody>
+      </p:sp>
+      <p:sp>
+        <p:nvSpPr>
+          <p:cNvPr id="3" name="TextBox 2"/>
+          <p:cNvSpPr txBox="1"/>
+          <p:nvPr/>
+        </p:nvSpPr>
+        <p:spPr>
+          <a:xfrm>
+            <a:off x="1809215" y="3419551"/>
+            <a:ext cx="8665029" cy="1107996"/>
+          </a:xfrm>
+          <a:prstGeom prst="rect">
+            <a:avLst/>
+          </a:prstGeom>
+          <a:noFill/>
+        </p:spPr>
+        <p:txBody>
+          <a:bodyPr wrap="square" rtlCol="0">
+            <a:spAutoFit/>
+          </a:bodyPr>
+          <a:lstStyle/>
+          <a:p>
+            <a:pPr algn="ctr"/>
+            <a:r>
+              <a:rPr lang="en-US" sz="6600" dirty="0" smtClean="0">
+                <a:solidFill>
+                  <a:schemeClr val="accent1"/>
+                </a:solidFill>
+              </a:rPr>
+              <a:t>joe</a:t>
+            </a:r>
+            <a:r>
+              <a:rPr lang="en-US" sz="6600" dirty="0" smtClean="0"/>
+              <a:t>.imagenomnom.com</a:t>
+            </a:r>
+            <a:endParaRPr lang="en-US" sz="6600" dirty="0"/>
+          </a:p>
+        </p:txBody>
+      </p:sp>
+    </p:spTree>
+    <p:extLst>
+      <p:ext uri="{BB962C8B-B14F-4D97-AF65-F5344CB8AC3E}">
+        <p14:creationId xmlns:p14="http://schemas.microsoft.com/office/powerpoint/2010/main" val="431034151"/>
+      </p:ext>
+    </p:extLst>
+  </p:cSld>
+  <p:clrMapOvr>
+    <a:masterClrMapping/>
+  </p:clrMapOvr>
+  <p:timing>
+    <p:tnLst>
+      <p:par>
+        <p:cTn id="1" dur="indefinite" restart="never" nodeType="tmRoot">
+          <p:childTnLst>
+            <p:seq concurrent="1" nextAc="seek">
+              <p:cTn id="2" dur="indefinite" nodeType="mainSeq">
+                <p:childTnLst>
+                  <p:par>
+                    <p:cTn id="3" fill="hold">
+                      <p:stCondLst>
+                        <p:cond delay="indefinite"/>
+                      </p:stCondLst>
+                      <p:childTnLst>
+                        <p:par>
+                          <p:cTn id="4" fill="hold">
+                            <p:stCondLst>
+                              <p:cond delay="0"/>
+                            </p:stCondLst>
+                            <p:childTnLst>
+                              <p:par>
+                                <p:cTn id="5" presetID="1" presetClass="entr" presetSubtype="0" fill="hold" nodeType="clickEffect">
+                                  <p:stCondLst>
+                                    <p:cond delay="0"/>
+                                  </p:stCondLst>
+                                  <p:childTnLst>
+                                    <p:set>
+                                      <p:cBhvr>
+                                        <p:cTn id="6" dur="1" fill="hold">
+                                          <p:stCondLst>
+                                            <p:cond delay="0"/>
+                                          </p:stCondLst>
+                                        </p:cTn>
+                                        <p:tgtEl>
+                                          <p:spTgt spid="5">
+                                            <p:txEl>
+                                              <p:pRg st="0" end="0"/>
+                                            </p:txEl>
+                                          </p:spTgt>
+                                        </p:tgtEl>
+                                        <p:attrNameLst>
+                                          <p:attrName>style.visibility</p:attrName>
+                                        </p:attrNameLst>
+                                      </p:cBhvr>
+                                      <p:to>
+                                        <p:strVal val="visible"/>
+                                      </p:to>
+                                    </p:set>
+                                  </p:childTnLst>
+                                </p:cTn>
+                              </p:par>
+                            </p:childTnLst>
+                          </p:cTn>
+                        </p:par>
+                      </p:childTnLst>
+                    </p:cTn>
+                  </p:par>
+                  <p:par>
+                    <p:cTn id="7" fill="hold">
+                      <p:stCondLst>
+                        <p:cond delay="indefinite"/>
+                      </p:stCondLst>
+                      <p:childTnLst>
+                        <p:par>
+                          <p:cTn id="8" fill="hold">
+                            <p:stCondLst>
+                              <p:cond delay="0"/>
+                            </p:stCondLst>
+                            <p:childTnLst>
+                              <p:par>
+                                <p:cTn id="9" presetID="1" presetClass="entr" presetSubtype="0" fill="hold" grpId="0" nodeType="clickEffect">
+                                  <p:stCondLst>
+                                    <p:cond delay="0"/>
+                                  </p:stCondLst>
+                                  <p:childTnLst>
+                                    <p:set>
+                                      <p:cBhvr>
+                                        <p:cTn id="10" dur="1" fill="hold">
+                                          <p:stCondLst>
+                                            <p:cond delay="0"/>
+                                          </p:stCondLst>
+                                        </p:cTn>
+                                        <p:tgtEl>
+                                          <p:spTgt spid="3"/>
+                                        </p:tgtEl>
+                                        <p:attrNameLst>
+                                          <p:attrName>style.visibility</p:attrName>
+                                        </p:attrNameLst>
+                                      </p:cBhvr>
+                                      <p:to>
+                                        <p:strVal val="visible"/>
+                                      </p:to>
+                                    </p:set>
+                                  </p:childTnLst>
+                                </p:cTn>
+                              </p:par>
+                            </p:childTnLst>
+                          </p:cTn>
+                        </p:par>
+                      </p:childTnLst>
+                    </p:cTn>
+                  </p:par>
+                  <p:par>
+                    <p:cTn id="11" fill="hold">
+                      <p:stCondLst>
+                        <p:cond delay="indefinite"/>
+                      </p:stCondLst>
+                      <p:childTnLst>
+                        <p:par>
+                          <p:cTn id="12" fill="hold">
+                            <p:stCondLst>
+                              <p:cond delay="0"/>
+                            </p:stCondLst>
+                            <p:childTnLst>
+                              <p:par>
+                                <p:cTn id="13" presetID="1" presetClass="exit" presetSubtype="0" fill="hold" grpId="1" nodeType="clickEffect">
+                                  <p:stCondLst>
+                                    <p:cond delay="0"/>
+                                  </p:stCondLst>
+                                  <p:childTnLst>
+                                    <p:set>
+                                      <p:cBhvr>
+                                        <p:cTn id="14" dur="1" fill="hold">
+                                          <p:stCondLst>
+                                            <p:cond delay="0"/>
+                                          </p:stCondLst>
+                                        </p:cTn>
+                                        <p:tgtEl>
+                                          <p:spTgt spid="3"/>
+                                        </p:tgtEl>
+                                        <p:attrNameLst>
+                                          <p:attrName>style.visibility</p:attrName>
+                                        </p:attrNameLst>
+                                      </p:cBhvr>
+                                      <p:to>
+                                        <p:strVal val="hidden"/>
+                                      </p:to>
+                                    </p:set>
+                                  </p:childTnLst>
+                                </p:cTn>
+                              </p:par>
+                            </p:childTnLst>
+                          </p:cTn>
+                        </p:par>
+                      </p:childTnLst>
+                    </p:cTn>
+                  </p:par>
+                  <p:par>
+                    <p:cTn id="15" fill="hold">
+                      <p:stCondLst>
+                        <p:cond delay="indefinite"/>
+                      </p:stCondLst>
+                      <p:childTnLst>
+                        <p:par>
+                          <p:cTn id="16" fill="hold">
+                            <p:stCondLst>
+                              <p:cond delay="0"/>
+                            </p:stCondLst>
+                            <p:childTnLst>
+                              <p:par>
+                                <p:cTn id="17" presetID="1" presetClass="entr" presetSubtype="0" fill="hold" nodeType="clickEffect">
+                                  <p:stCondLst>
+                                    <p:cond delay="0"/>
+                                  </p:stCondLst>
+                                  <p:childTnLst>
+                                    <p:set>
+                                      <p:cBhvr>
+                                        <p:cTn id="18" dur="1" fill="hold">
+                                          <p:stCondLst>
+                                            <p:cond delay="0"/>
+                                          </p:stCondLst>
+                                        </p:cTn>
+                                        <p:tgtEl>
+                                          <p:spTgt spid="5">
+                                            <p:txEl>
+                                              <p:pRg st="1" end="1"/>
+                                            </p:txEl>
+                                          </p:spTgt>
+                                        </p:tgtEl>
+                                        <p:attrNameLst>
+                                          <p:attrName>style.visibility</p:attrName>
+                                        </p:attrNameLst>
+                                      </p:cBhvr>
+                                      <p:to>
+                                        <p:strVal val="visible"/>
+                                      </p:to>
+                                    </p:set>
+                                  </p:childTnLst>
+                                </p:cTn>
+                              </p:par>
+                            </p:childTnLst>
+                          </p:cTn>
+                        </p:par>
+                      </p:childTnLst>
+                    </p:cTn>
+                  </p:par>
+                  <p:par>
+                    <p:cTn id="19" fill="hold">
+                      <p:stCondLst>
+                        <p:cond delay="indefinite"/>
+                      </p:stCondLst>
+                      <p:childTnLst>
+                        <p:par>
+                          <p:cTn id="20" fill="hold">
+                            <p:stCondLst>
+                              <p:cond delay="0"/>
+                            </p:stCondLst>
+                            <p:childTnLst>
+                              <p:par>
+                                <p:cTn id="21" presetID="1" presetClass="entr" presetSubtype="0" fill="hold" nodeType="clickEffect">
+                                  <p:stCondLst>
+                                    <p:cond delay="0"/>
+                                  </p:stCondLst>
+                                  <p:childTnLst>
+                                    <p:set>
+                                      <p:cBhvr>
+                                        <p:cTn id="22" dur="1" fill="hold">
+                                          <p:stCondLst>
+                                            <p:cond delay="0"/>
+                                          </p:stCondLst>
+                                        </p:cTn>
+                                        <p:tgtEl>
+                                          <p:spTgt spid="5">
+                                            <p:txEl>
+                                              <p:pRg st="2" end="2"/>
+                                            </p:txEl>
+                                          </p:spTgt>
+                                        </p:tgtEl>
+                                        <p:attrNameLst>
+                                          <p:attrName>style.visibility</p:attrName>
+                                        </p:attrNameLst>
+                                      </p:cBhvr>
+                                      <p:to>
+                                        <p:strVal val="visible"/>
+                                      </p:to>
+                                    </p:set>
+                                  </p:childTnLst>
+                                </p:cTn>
+                              </p:par>
+                            </p:childTnLst>
+                          </p:cTn>
+                        </p:par>
+                      </p:childTnLst>
+                    </p:cTn>
+                  </p:par>
+                </p:childTnLst>
+              </p:cTn>
+              <p:prevCondLst>
+                <p:cond evt="onPrev" delay="0">
+                  <p:tgtEl>
+                    <p:sldTgt/>
+                  </p:tgtEl>
+                </p:cond>
+              </p:prevCondLst>
+              <p:nextCondLst>
+                <p:cond evt="onNext" delay="0">
+                  <p:tgtEl>
+                    <p:sldTgt/>
+                  </p:tgtEl>
+                </p:cond>
+              </p:nextCondLst>
+            </p:seq>
+          </p:childTnLst>
+        </p:cTn>
+      </p:par>
+    </p:tnLst>
+    <p:bldLst>
+      <p:bldP spid="3" grpId="0"/>
+      <p:bldP spid="3" grpId="1"/>
+    </p:bldLst>
+  </p:timing>
+</p:sld>
+</file>
+
+<file path=ppt/slides/slide13.xml><?xml version="1.0" encoding="utf-8"?>
+<p:sld xmlns:a="http://schemas.openxmlformats.org/drawingml/2006/main" xmlns:r="http://schemas.openxmlformats.org/officeDocument/2006/relationships" xmlns:p="http://schemas.openxmlformats.org/presentationml/2006/main">
+  <p:cSld>
+    <p:spTree>
+      <p:nvGrpSpPr>
+        <p:cNvPr id="1" name=""/>
+        <p:cNvGrpSpPr/>
+        <p:nvPr/>
+      </p:nvGrpSpPr>
+      <p:grpSpPr>
+        <a:xfrm>
+          <a:off x="0" y="0"/>
+          <a:ext cx="0" cy="0"/>
+          <a:chOff x="0" y="0"/>
+          <a:chExt cx="0" cy="0"/>
+        </a:xfrm>
+      </p:grpSpPr>
+      <p:sp>
+        <p:nvSpPr>
+          <p:cNvPr id="2" name="Title 1"/>
+          <p:cNvSpPr>
+            <a:spLocks noGrp="1"/>
+          </p:cNvSpPr>
+          <p:nvPr>
+            <p:ph type="title"/>
+          </p:nvPr>
+        </p:nvSpPr>
+        <p:spPr/>
+        <p:txBody>
+          <a:bodyPr/>
+          <a:lstStyle/>
+          <a:p>
+            <a:endParaRPr lang="en-US"/>
+          </a:p>
+        </p:txBody>
+      </p:sp>
+      <p:sp>
+        <p:nvSpPr>
+          <p:cNvPr id="3" name="Content Placeholder 2"/>
+          <p:cNvSpPr>
+            <a:spLocks noGrp="1"/>
+          </p:cNvSpPr>
+          <p:nvPr>
+            <p:ph sz="quarter" idx="10"/>
+          </p:nvPr>
+        </p:nvSpPr>
+        <p:spPr/>
+        <p:txBody>
+          <a:bodyPr/>
+          <a:lstStyle/>
+          <a:p>
+            <a:endParaRPr lang="en-US"/>
+          </a:p>
+        </p:txBody>
+      </p:sp>
+    </p:spTree>
+    <p:extLst>
+      <p:ext uri="{BB962C8B-B14F-4D97-AF65-F5344CB8AC3E}">
+        <p14:creationId xmlns:p14="http://schemas.microsoft.com/office/powerpoint/2010/main" val="4244839126"/>
+      </p:ext>
+    </p:extLst>
+  </p:cSld>
+  <p:clrMapOvr>
+    <a:masterClrMapping/>
+  </p:clrMapOvr>
+  <p:timing>
+    <p:tnLst>
+      <p:par>
+        <p:cTn id="1" dur="indefinite" restart="never" nodeType="tmRoot"/>
+      </p:par>
+    </p:tnLst>
+  </p:timing>
+</p:sld>
+</file>
+
 <file path=ppt/slides/slide2.xml><?xml version="1.0" encoding="utf-8"?>
 <p:sld xmlns:a="http://schemas.openxmlformats.org/drawingml/2006/main" xmlns:r="http://schemas.openxmlformats.org/officeDocument/2006/relationships" xmlns:p="http://schemas.openxmlformats.org/presentationml/2006/main">
   <p:cSld>
@@ -3767,43 +5569,6 @@
       </p:grpSpPr>
       <p:sp>
         <p:nvSpPr>
-          <p:cNvPr id="7" name="Content Placeholder 6"/>
-          <p:cNvSpPr>
-            <a:spLocks noGrp="1"/>
-          </p:cNvSpPr>
-          <p:nvPr>
-            <p:ph sz="quarter" idx="10"/>
-          </p:nvPr>
-        </p:nvSpPr>
-        <p:spPr/>
-        <p:txBody>
-          <a:bodyPr>
-            <a:normAutofit/>
-          </a:bodyPr>
-          <a:lstStyle/>
-          <a:p>
-            <a:r>
-              <a:rPr lang="en-GB" dirty="0" smtClean="0"/>
-              <a:t>Topic One</a:t>
-            </a:r>
-          </a:p>
-          <a:p>
-            <a:r>
-              <a:rPr lang="en-GB" dirty="0" smtClean="0"/>
-              <a:t>Topic Two</a:t>
-            </a:r>
-          </a:p>
-          <a:p>
-            <a:r>
-              <a:rPr lang="en-GB" dirty="0" smtClean="0"/>
-              <a:t>Topic Three</a:t>
-            </a:r>
-            <a:endParaRPr lang="en-GB" dirty="0"/>
-          </a:p>
-        </p:txBody>
-      </p:sp>
-      <p:sp>
-        <p:nvSpPr>
           <p:cNvPr id="2" name="Title 1"/>
           <p:cNvSpPr>
             <a:spLocks noGrp="1"/>
@@ -3814,106 +5579,356 @@
         </p:nvSpPr>
         <p:spPr/>
         <p:txBody>
-          <a:bodyPr/>
-          <a:lstStyle/>
-          <a:p>
-            <a:r>
-              <a:rPr lang="en-US" smtClean="0"/>
-              <a:t>Module Overview</a:t>
-            </a:r>
-            <a:endParaRPr lang="en-US" dirty="0"/>
-          </a:p>
-        </p:txBody>
-      </p:sp>
-      <p:sp>
-        <p:nvSpPr>
-          <p:cNvPr id="4" name="TextBox 3"/>
-          <p:cNvSpPr txBox="1"/>
-          <p:nvPr/>
-        </p:nvSpPr>
-        <p:spPr>
-          <a:xfrm>
-            <a:off x="4432363" y="1155171"/>
-            <a:ext cx="3671248" cy="646331"/>
-          </a:xfrm>
-          <a:prstGeom prst="rect">
-            <a:avLst/>
-          </a:prstGeom>
-          <a:solidFill>
-            <a:srgbClr val="FFFF00"/>
-          </a:solidFill>
-        </p:spPr>
-        <p:txBody>
-          <a:bodyPr wrap="square" rtlCol="0">
-            <a:spAutoFit/>
+          <a:bodyPr>
+            <a:normAutofit/>
           </a:bodyPr>
           <a:lstStyle/>
           <a:p>
+            <a:pPr lvl="0"/>
             <a:r>
               <a:rPr lang="en-US" dirty="0" smtClean="0"/>
-              <a:t>Please make sure there’s a “Module Overview” slide for every module</a:t>
+              <a:t>Course Topics</a:t>
             </a:r>
             <a:endParaRPr lang="en-US" dirty="0"/>
           </a:p>
         </p:txBody>
       </p:sp>
-      <p:sp>
-        <p:nvSpPr>
-          <p:cNvPr id="5" name="TextBox 4"/>
-          <p:cNvSpPr txBox="1"/>
-          <p:nvPr/>
-        </p:nvSpPr>
-        <p:spPr>
-          <a:xfrm>
-            <a:off x="9906000" y="-1"/>
-            <a:ext cx="2286000" cy="2031325"/>
-          </a:xfrm>
-          <a:prstGeom prst="rect">
-            <a:avLst/>
-          </a:prstGeom>
-          <a:solidFill>
-            <a:srgbClr val="FFFF00"/>
-          </a:solidFill>
-          <a:ln>
-            <a:noFill/>
-          </a:ln>
-        </p:spPr>
-        <p:txBody>
-          <a:bodyPr wrap="square" rtlCol="0">
-            <a:spAutoFit/>
-          </a:bodyPr>
-          <a:lstStyle/>
-          <a:p>
-            <a:pPr algn="ctr"/>
-            <a:endParaRPr lang="en-US" dirty="0" smtClean="0"/>
-          </a:p>
-          <a:p>
-            <a:pPr algn="ctr"/>
-            <a:endParaRPr lang="en-US" dirty="0"/>
-          </a:p>
-          <a:p>
-            <a:pPr algn="ctr"/>
-            <a:r>
-              <a:rPr lang="en-US" dirty="0" smtClean="0"/>
-              <a:t>Please leave this area blank to allow for picture in picture recording</a:t>
-            </a:r>
-          </a:p>
-          <a:p>
-            <a:pPr algn="ctr"/>
-            <a:endParaRPr lang="en-US" dirty="0"/>
-          </a:p>
-        </p:txBody>
-      </p:sp>
+      <p:graphicFrame>
+        <p:nvGraphicFramePr>
+          <p:cNvPr id="4" name="Content Placeholder 3"/>
+          <p:cNvGraphicFramePr>
+            <a:graphicFrameLocks noGrp="1"/>
+          </p:cNvGraphicFramePr>
+          <p:nvPr>
+            <p:ph sz="quarter" idx="10"/>
+            <p:extLst/>
+          </p:nvPr>
+        </p:nvGraphicFramePr>
+        <p:xfrm>
+          <a:off x="379413" y="1417636"/>
+          <a:ext cx="11525250" cy="3838160"/>
+        </p:xfrm>
+        <a:graphic>
+          <a:graphicData uri="http://schemas.openxmlformats.org/drawingml/2006/table">
+            <a:tbl>
+              <a:tblPr firstRow="1" bandRow="1">
+                <a:tableStyleId>{5C22544A-7EE6-4342-B048-85BDC9FD1C3A}</a:tableStyleId>
+              </a:tblPr>
+              <a:tblGrid>
+                <a:gridCol w="5762625">
+                  <a:extLst>
+                    <a:ext uri="{9D8B030D-6E8A-4147-A177-3AD203B41FA5}">
+                      <a16:colId xmlns="" xmlns:a16="http://schemas.microsoft.com/office/drawing/2014/main" val="1632794655"/>
+                    </a:ext>
+                  </a:extLst>
+                </a:gridCol>
+                <a:gridCol w="5762625">
+                  <a:extLst>
+                    <a:ext uri="{9D8B030D-6E8A-4147-A177-3AD203B41FA5}">
+                      <a16:colId xmlns="" xmlns:a16="http://schemas.microsoft.com/office/drawing/2014/main" val="2011313899"/>
+                    </a:ext>
+                  </a:extLst>
+                </a:gridCol>
+              </a:tblGrid>
+              <a:tr h="767632">
+                <a:tc gridSpan="2">
+                  <a:txBody>
+                    <a:bodyPr/>
+                    <a:lstStyle/>
+                    <a:p>
+                      <a:r>
+                        <a:rPr lang="en-US" sz="3600" dirty="0" smtClean="0">
+                          <a:latin typeface="Segoe UI Light" panose="020B0502040204020203" pitchFamily="34" charset="0"/>
+                          <a:cs typeface="Segoe UI Light" panose="020B0502040204020203" pitchFamily="34" charset="0"/>
+                        </a:rPr>
+                        <a:t>Applications on Azure: Putting All the Pieces Together</a:t>
+                      </a:r>
+                      <a:endParaRPr lang="en-US" sz="3600" dirty="0">
+                        <a:latin typeface="Segoe UI Light" panose="020B0502040204020203" pitchFamily="34" charset="0"/>
+                        <a:cs typeface="Segoe UI Light" panose="020B0502040204020203" pitchFamily="34" charset="0"/>
+                      </a:endParaRPr>
+                    </a:p>
+                  </a:txBody>
+                  <a:tcPr anchor="ctr"/>
+                </a:tc>
+                <a:tc hMerge="1">
+                  <a:txBody>
+                    <a:bodyPr/>
+                    <a:lstStyle/>
+                    <a:p>
+                      <a:endParaRPr lang="en-US" dirty="0"/>
+                    </a:p>
+                  </a:txBody>
+                  <a:tcPr/>
+                </a:tc>
+                <a:extLst>
+                  <a:ext uri="{0D108BD9-81ED-4DB2-BD59-A6C34878D82A}">
+                    <a16:rowId xmlns="" xmlns:a16="http://schemas.microsoft.com/office/drawing/2014/main" val="1789177411"/>
+                  </a:ext>
+                </a:extLst>
+              </a:tr>
+              <a:tr h="767632">
+                <a:tc>
+                  <a:txBody>
+                    <a:bodyPr/>
+                    <a:lstStyle/>
+                    <a:p>
+                      <a:r>
+                        <a:rPr lang="en-US" sz="2400" dirty="0" smtClean="0">
+                          <a:latin typeface="Segoe UI Light" panose="020B0502040204020203" pitchFamily="34" charset="0"/>
+                          <a:cs typeface="Segoe UI Light" panose="020B0502040204020203" pitchFamily="34" charset="0"/>
+                        </a:rPr>
+                        <a:t>01 | Intro</a:t>
+                      </a:r>
+                      <a:endParaRPr lang="en-US" sz="2400" dirty="0">
+                        <a:latin typeface="Segoe UI Light" panose="020B0502040204020203" pitchFamily="34" charset="0"/>
+                        <a:cs typeface="Segoe UI Light" panose="020B0502040204020203" pitchFamily="34" charset="0"/>
+                      </a:endParaRPr>
+                    </a:p>
+                  </a:txBody>
+                  <a:tcPr anchor="ctr"/>
+                </a:tc>
+                <a:tc>
+                  <a:txBody>
+                    <a:bodyPr/>
+                    <a:lstStyle/>
+                    <a:p>
+                      <a:r>
+                        <a:rPr lang="en-US" sz="2400" dirty="0" smtClean="0">
+                          <a:latin typeface="Segoe UI Light" panose="020B0502040204020203" pitchFamily="34" charset="0"/>
+                          <a:cs typeface="Segoe UI Light" panose="020B0502040204020203" pitchFamily="34" charset="0"/>
+                        </a:rPr>
+                        <a:t>05 | Storing Data and Objects in Azure</a:t>
+                      </a:r>
+                      <a:endParaRPr lang="en-US" sz="2400" dirty="0">
+                        <a:latin typeface="Segoe UI Light" panose="020B0502040204020203" pitchFamily="34" charset="0"/>
+                        <a:cs typeface="Segoe UI Light" panose="020B0502040204020203" pitchFamily="34" charset="0"/>
+                      </a:endParaRPr>
+                    </a:p>
+                  </a:txBody>
+                  <a:tcPr anchor="ctr"/>
+                </a:tc>
+                <a:extLst>
+                  <a:ext uri="{0D108BD9-81ED-4DB2-BD59-A6C34878D82A}">
+                    <a16:rowId xmlns="" xmlns:a16="http://schemas.microsoft.com/office/drawing/2014/main" val="3842815335"/>
+                  </a:ext>
+                </a:extLst>
+              </a:tr>
+              <a:tr h="767632">
+                <a:tc>
+                  <a:txBody>
+                    <a:bodyPr/>
+                    <a:lstStyle/>
+                    <a:p>
+                      <a:r>
+                        <a:rPr lang="en-US" sz="2400" dirty="0" smtClean="0">
+                          <a:latin typeface="Segoe UI Light" panose="020B0502040204020203" pitchFamily="34" charset="0"/>
+                          <a:cs typeface="Segoe UI Light" panose="020B0502040204020203" pitchFamily="34" charset="0"/>
+                        </a:rPr>
+                        <a:t>02 | Exploring Application Architecture</a:t>
+                      </a:r>
+                      <a:endParaRPr lang="en-US" sz="2400" dirty="0">
+                        <a:latin typeface="Segoe UI Light" panose="020B0502040204020203" pitchFamily="34" charset="0"/>
+                        <a:cs typeface="Segoe UI Light" panose="020B0502040204020203" pitchFamily="34" charset="0"/>
+                      </a:endParaRPr>
+                    </a:p>
+                  </a:txBody>
+                  <a:tcPr anchor="ctr"/>
+                </a:tc>
+                <a:tc>
+                  <a:txBody>
+                    <a:bodyPr/>
+                    <a:lstStyle/>
+                    <a:p>
+                      <a:r>
+                        <a:rPr lang="en-US" sz="2400" dirty="0" smtClean="0">
+                          <a:latin typeface="Segoe UI Light" panose="020B0502040204020203" pitchFamily="34" charset="0"/>
+                          <a:cs typeface="Segoe UI Light" panose="020B0502040204020203" pitchFamily="34" charset="0"/>
+                        </a:rPr>
+                        <a:t>06 | </a:t>
+                      </a:r>
+                      <a:r>
+                        <a:rPr lang="en-US" sz="2400" dirty="0" err="1" smtClean="0">
+                          <a:latin typeface="Segoe UI Light" panose="020B0502040204020203" pitchFamily="34" charset="0"/>
+                          <a:cs typeface="Segoe UI Light" panose="020B0502040204020203" pitchFamily="34" charset="0"/>
+                        </a:rPr>
+                        <a:t>ElasticSearch</a:t>
+                      </a:r>
+                      <a:r>
+                        <a:rPr lang="en-US" sz="2400" dirty="0" smtClean="0">
+                          <a:latin typeface="Segoe UI Light" panose="020B0502040204020203" pitchFamily="34" charset="0"/>
+                          <a:cs typeface="Segoe UI Light" panose="020B0502040204020203" pitchFamily="34" charset="0"/>
+                        </a:rPr>
+                        <a:t>,</a:t>
+                      </a:r>
+                      <a:r>
+                        <a:rPr lang="en-US" sz="2400" baseline="0" dirty="0" smtClean="0">
+                          <a:latin typeface="Segoe UI Light" panose="020B0502040204020203" pitchFamily="34" charset="0"/>
+                          <a:cs typeface="Segoe UI Light" panose="020B0502040204020203" pitchFamily="34" charset="0"/>
+                        </a:rPr>
+                        <a:t> </a:t>
+                      </a:r>
+                      <a:r>
+                        <a:rPr lang="en-US" sz="2400" dirty="0" smtClean="0">
+                          <a:latin typeface="Segoe UI Light" panose="020B0502040204020203" pitchFamily="34" charset="0"/>
+                          <a:cs typeface="Segoe UI Light" panose="020B0502040204020203" pitchFamily="34" charset="0"/>
+                        </a:rPr>
+                        <a:t>Docker and YOU</a:t>
+                      </a:r>
+                      <a:endParaRPr lang="en-US" sz="2400" dirty="0">
+                        <a:latin typeface="Segoe UI Light" panose="020B0502040204020203" pitchFamily="34" charset="0"/>
+                        <a:cs typeface="Segoe UI Light" panose="020B0502040204020203" pitchFamily="34" charset="0"/>
+                      </a:endParaRPr>
+                    </a:p>
+                  </a:txBody>
+                  <a:tcPr anchor="ctr"/>
+                </a:tc>
+                <a:extLst>
+                  <a:ext uri="{0D108BD9-81ED-4DB2-BD59-A6C34878D82A}">
+                    <a16:rowId xmlns="" xmlns:a16="http://schemas.microsoft.com/office/drawing/2014/main" val="321066646"/>
+                  </a:ext>
+                </a:extLst>
+              </a:tr>
+              <a:tr h="767632">
+                <a:tc>
+                  <a:txBody>
+                    <a:bodyPr/>
+                    <a:lstStyle/>
+                    <a:p>
+                      <a:pPr marL="0" marR="0" indent="0" algn="l" defTabSz="914088" rtl="0" eaLnBrk="1" fontAlgn="auto" latinLnBrk="0" hangingPunct="1">
+                        <a:lnSpc>
+                          <a:spcPct val="100000"/>
+                        </a:lnSpc>
+                        <a:spcBef>
+                          <a:spcPts val="0"/>
+                        </a:spcBef>
+                        <a:spcAft>
+                          <a:spcPts val="0"/>
+                        </a:spcAft>
+                        <a:buClrTx/>
+                        <a:buSzTx/>
+                        <a:buFontTx/>
+                        <a:buNone/>
+                        <a:tabLst/>
+                        <a:defRPr/>
+                      </a:pPr>
+                      <a:r>
+                        <a:rPr lang="en-US" sz="2400" dirty="0" smtClean="0">
+                          <a:latin typeface="Segoe UI Light" panose="020B0502040204020203" pitchFamily="34" charset="0"/>
+                          <a:cs typeface="Segoe UI Light" panose="020B0502040204020203" pitchFamily="34" charset="0"/>
+                        </a:rPr>
+                        <a:t>03</a:t>
+                      </a:r>
+                      <a:r>
+                        <a:rPr lang="en-US" sz="2400" baseline="0" dirty="0" smtClean="0">
+                          <a:latin typeface="Segoe UI Light" panose="020B0502040204020203" pitchFamily="34" charset="0"/>
+                          <a:cs typeface="Segoe UI Light" panose="020B0502040204020203" pitchFamily="34" charset="0"/>
+                        </a:rPr>
+                        <a:t> | Working with Azure DNS Services</a:t>
+                      </a:r>
+                      <a:endParaRPr lang="en-US" sz="2400" dirty="0" smtClean="0">
+                        <a:latin typeface="Segoe UI Light" panose="020B0502040204020203" pitchFamily="34" charset="0"/>
+                        <a:cs typeface="Segoe UI Light" panose="020B0502040204020203" pitchFamily="34" charset="0"/>
+                      </a:endParaRPr>
+                    </a:p>
+                  </a:txBody>
+                  <a:tcPr anchor="ctr"/>
+                </a:tc>
+                <a:tc>
+                  <a:txBody>
+                    <a:bodyPr/>
+                    <a:lstStyle/>
+                    <a:p>
+                      <a:r>
+                        <a:rPr lang="en-US" sz="2400" dirty="0" smtClean="0">
+                          <a:latin typeface="Segoe UI Light" panose="020B0502040204020203" pitchFamily="34" charset="0"/>
+                          <a:cs typeface="Segoe UI Light" panose="020B0502040204020203" pitchFamily="34" charset="0"/>
+                        </a:rPr>
+                        <a:t>07 | Scaling Your Application Under Load</a:t>
+                      </a:r>
+                      <a:endParaRPr lang="en-US" sz="2400" dirty="0">
+                        <a:latin typeface="Segoe UI Light" panose="020B0502040204020203" pitchFamily="34" charset="0"/>
+                        <a:cs typeface="Segoe UI Light" panose="020B0502040204020203" pitchFamily="34" charset="0"/>
+                      </a:endParaRPr>
+                    </a:p>
+                  </a:txBody>
+                  <a:tcPr anchor="ctr"/>
+                </a:tc>
+                <a:extLst>
+                  <a:ext uri="{0D108BD9-81ED-4DB2-BD59-A6C34878D82A}">
+                    <a16:rowId xmlns="" xmlns:a16="http://schemas.microsoft.com/office/drawing/2014/main" val="3812060533"/>
+                  </a:ext>
+                </a:extLst>
+              </a:tr>
+              <a:tr h="767632">
+                <a:tc>
+                  <a:txBody>
+                    <a:bodyPr/>
+                    <a:lstStyle/>
+                    <a:p>
+                      <a:r>
+                        <a:rPr lang="en-US" sz="2400" dirty="0" smtClean="0">
+                          <a:latin typeface="Segoe UI Light" panose="020B0502040204020203" pitchFamily="34" charset="0"/>
+                          <a:cs typeface="Segoe UI Light" panose="020B0502040204020203" pitchFamily="34" charset="0"/>
+                        </a:rPr>
+                        <a:t>04 | Executing Large Tasks in the Cloud</a:t>
+                      </a:r>
+                      <a:endParaRPr lang="en-US" sz="2400" dirty="0">
+                        <a:latin typeface="Segoe UI Light" panose="020B0502040204020203" pitchFamily="34" charset="0"/>
+                        <a:cs typeface="Segoe UI Light" panose="020B0502040204020203" pitchFamily="34" charset="0"/>
+                      </a:endParaRPr>
+                    </a:p>
+                  </a:txBody>
+                  <a:tcPr anchor="ctr"/>
+                </a:tc>
+                <a:tc>
+                  <a:txBody>
+                    <a:bodyPr/>
+                    <a:lstStyle/>
+                    <a:p>
+                      <a:r>
+                        <a:rPr lang="en-US" sz="2400" dirty="0" smtClean="0">
+                          <a:latin typeface="Segoe UI Light" panose="020B0502040204020203" pitchFamily="34" charset="0"/>
+                          <a:cs typeface="Segoe UI Light" panose="020B0502040204020203" pitchFamily="34" charset="0"/>
+                        </a:rPr>
+                        <a:t>08 | Rewind</a:t>
+                      </a:r>
+                      <a:endParaRPr lang="en-US" sz="2400" dirty="0">
+                        <a:latin typeface="Segoe UI Light" panose="020B0502040204020203" pitchFamily="34" charset="0"/>
+                        <a:cs typeface="Segoe UI Light" panose="020B0502040204020203" pitchFamily="34" charset="0"/>
+                      </a:endParaRPr>
+                    </a:p>
+                  </a:txBody>
+                  <a:tcPr anchor="ctr"/>
+                </a:tc>
+                <a:extLst>
+                  <a:ext uri="{0D108BD9-81ED-4DB2-BD59-A6C34878D82A}">
+                    <a16:rowId xmlns="" xmlns:a16="http://schemas.microsoft.com/office/drawing/2014/main" val="733235577"/>
+                  </a:ext>
+                </a:extLst>
+              </a:tr>
+            </a:tbl>
+          </a:graphicData>
+        </a:graphic>
+      </p:graphicFrame>
     </p:spTree>
     <p:extLst>
       <p:ext uri="{BB962C8B-B14F-4D97-AF65-F5344CB8AC3E}">
-        <p14:creationId xmlns:p14="http://schemas.microsoft.com/office/powerpoint/2010/main" val="318349970"/>
+        <p14:creationId xmlns:p14="http://schemas.microsoft.com/office/powerpoint/2010/main" val="3503996387"/>
       </p:ext>
     </p:extLst>
   </p:cSld>
   <p:clrMapOvr>
     <a:masterClrMapping/>
   </p:clrMapOvr>
+  <mc:AlternateContent xmlns:mc="http://schemas.openxmlformats.org/markup-compatibility/2006">
+    <mc:Choice xmlns:p14="http://schemas.microsoft.com/office/powerpoint/2010/main" Requires="p14">
+      <p:transition spd="slow" p14:dur="2000"/>
+    </mc:Choice>
+    <mc:Fallback>
+      <p:transition spd="slow"/>
+    </mc:Fallback>
+  </mc:AlternateContent>
   <p:timing>
     <p:tnLst>
       <p:par>
@@ -3953,20 +5968,397 @@
         </p:nvSpPr>
         <p:spPr/>
         <p:txBody>
-          <a:bodyPr/>
+          <a:bodyPr>
+            <a:normAutofit/>
+          </a:bodyPr>
           <a:lstStyle/>
           <a:p>
+            <a:pPr lvl="0"/>
             <a:r>
               <a:rPr lang="en-US" dirty="0" smtClean="0"/>
-              <a:t>Lesson slide</a:t>
+              <a:t>Course Topics</a:t>
             </a:r>
             <a:endParaRPr lang="en-US" dirty="0"/>
           </a:p>
         </p:txBody>
       </p:sp>
-      <p:sp>
-        <p:nvSpPr>
-          <p:cNvPr id="3" name="Content Placeholder 2"/>
+      <p:graphicFrame>
+        <p:nvGraphicFramePr>
+          <p:cNvPr id="4" name="Content Placeholder 3"/>
+          <p:cNvGraphicFramePr>
+            <a:graphicFrameLocks noGrp="1"/>
+          </p:cNvGraphicFramePr>
+          <p:nvPr>
+            <p:ph sz="quarter" idx="10"/>
+            <p:extLst>
+              <p:ext uri="{D42A27DB-BD31-4B8C-83A1-F6EECF244321}">
+                <p14:modId xmlns:p14="http://schemas.microsoft.com/office/powerpoint/2010/main" val="2098666291"/>
+              </p:ext>
+            </p:extLst>
+          </p:nvPr>
+        </p:nvGraphicFramePr>
+        <p:xfrm>
+          <a:off x="379413" y="1417636"/>
+          <a:ext cx="11525250" cy="3838160"/>
+        </p:xfrm>
+        <a:graphic>
+          <a:graphicData uri="http://schemas.openxmlformats.org/drawingml/2006/table">
+            <a:tbl>
+              <a:tblPr firstRow="1" bandRow="1">
+                <a:tableStyleId>{5C22544A-7EE6-4342-B048-85BDC9FD1C3A}</a:tableStyleId>
+              </a:tblPr>
+              <a:tblGrid>
+                <a:gridCol w="5762625">
+                  <a:extLst>
+                    <a:ext uri="{9D8B030D-6E8A-4147-A177-3AD203B41FA5}">
+                      <a16:colId xmlns="" xmlns:a16="http://schemas.microsoft.com/office/drawing/2014/main" val="1632794655"/>
+                    </a:ext>
+                  </a:extLst>
+                </a:gridCol>
+                <a:gridCol w="5762625">
+                  <a:extLst>
+                    <a:ext uri="{9D8B030D-6E8A-4147-A177-3AD203B41FA5}">
+                      <a16:colId xmlns="" xmlns:a16="http://schemas.microsoft.com/office/drawing/2014/main" val="2011313899"/>
+                    </a:ext>
+                  </a:extLst>
+                </a:gridCol>
+              </a:tblGrid>
+              <a:tr h="767632">
+                <a:tc gridSpan="2">
+                  <a:txBody>
+                    <a:bodyPr/>
+                    <a:lstStyle/>
+                    <a:p>
+                      <a:r>
+                        <a:rPr lang="en-US" sz="3600" dirty="0" smtClean="0">
+                          <a:latin typeface="Segoe UI Light" panose="020B0502040204020203" pitchFamily="34" charset="0"/>
+                          <a:cs typeface="Segoe UI Light" panose="020B0502040204020203" pitchFamily="34" charset="0"/>
+                        </a:rPr>
+                        <a:t>Applications on Azure: Putting All the Pieces Together</a:t>
+                      </a:r>
+                      <a:endParaRPr lang="en-US" sz="3600" dirty="0">
+                        <a:latin typeface="Segoe UI Light" panose="020B0502040204020203" pitchFamily="34" charset="0"/>
+                        <a:cs typeface="Segoe UI Light" panose="020B0502040204020203" pitchFamily="34" charset="0"/>
+                      </a:endParaRPr>
+                    </a:p>
+                  </a:txBody>
+                  <a:tcPr anchor="ctr"/>
+                </a:tc>
+                <a:tc hMerge="1">
+                  <a:txBody>
+                    <a:bodyPr/>
+                    <a:lstStyle/>
+                    <a:p>
+                      <a:endParaRPr lang="en-US" dirty="0"/>
+                    </a:p>
+                  </a:txBody>
+                  <a:tcPr/>
+                </a:tc>
+                <a:extLst>
+                  <a:ext uri="{0D108BD9-81ED-4DB2-BD59-A6C34878D82A}">
+                    <a16:rowId xmlns="" xmlns:a16="http://schemas.microsoft.com/office/drawing/2014/main" val="1789177411"/>
+                  </a:ext>
+                </a:extLst>
+              </a:tr>
+              <a:tr h="767632">
+                <a:tc>
+                  <a:txBody>
+                    <a:bodyPr/>
+                    <a:lstStyle/>
+                    <a:p>
+                      <a:r>
+                        <a:rPr lang="en-US" sz="2400" dirty="0" smtClean="0">
+                          <a:latin typeface="Segoe UI Light" panose="020B0502040204020203" pitchFamily="34" charset="0"/>
+                          <a:cs typeface="Segoe UI Light" panose="020B0502040204020203" pitchFamily="34" charset="0"/>
+                        </a:rPr>
+                        <a:t>01 | Intro</a:t>
+                      </a:r>
+                      <a:endParaRPr lang="en-US" sz="2400" dirty="0">
+                        <a:latin typeface="Segoe UI Light" panose="020B0502040204020203" pitchFamily="34" charset="0"/>
+                        <a:cs typeface="Segoe UI Light" panose="020B0502040204020203" pitchFamily="34" charset="0"/>
+                      </a:endParaRPr>
+                    </a:p>
+                  </a:txBody>
+                  <a:tcPr anchor="ctr"/>
+                </a:tc>
+                <a:tc>
+                  <a:txBody>
+                    <a:bodyPr/>
+                    <a:lstStyle/>
+                    <a:p>
+                      <a:r>
+                        <a:rPr lang="en-US" sz="2400" dirty="0" smtClean="0">
+                          <a:latin typeface="Segoe UI Light" panose="020B0502040204020203" pitchFamily="34" charset="0"/>
+                          <a:cs typeface="Segoe UI Light" panose="020B0502040204020203" pitchFamily="34" charset="0"/>
+                        </a:rPr>
+                        <a:t>05 | Storing Data and Objects in Azure</a:t>
+                      </a:r>
+                      <a:endParaRPr lang="en-US" sz="2400" dirty="0">
+                        <a:latin typeface="Segoe UI Light" panose="020B0502040204020203" pitchFamily="34" charset="0"/>
+                        <a:cs typeface="Segoe UI Light" panose="020B0502040204020203" pitchFamily="34" charset="0"/>
+                      </a:endParaRPr>
+                    </a:p>
+                  </a:txBody>
+                  <a:tcPr anchor="ctr"/>
+                </a:tc>
+                <a:extLst>
+                  <a:ext uri="{0D108BD9-81ED-4DB2-BD59-A6C34878D82A}">
+                    <a16:rowId xmlns="" xmlns:a16="http://schemas.microsoft.com/office/drawing/2014/main" val="3842815335"/>
+                  </a:ext>
+                </a:extLst>
+              </a:tr>
+              <a:tr h="767632">
+                <a:tc>
+                  <a:txBody>
+                    <a:bodyPr/>
+                    <a:lstStyle/>
+                    <a:p>
+                      <a:r>
+                        <a:rPr lang="en-US" sz="2400" dirty="0" smtClean="0">
+                          <a:latin typeface="Segoe UI Light" panose="020B0502040204020203" pitchFamily="34" charset="0"/>
+                          <a:cs typeface="Segoe UI Light" panose="020B0502040204020203" pitchFamily="34" charset="0"/>
+                        </a:rPr>
+                        <a:t>02 | Exploring Application Architecture</a:t>
+                      </a:r>
+                      <a:endParaRPr lang="en-US" sz="2400" dirty="0">
+                        <a:latin typeface="Segoe UI Light" panose="020B0502040204020203" pitchFamily="34" charset="0"/>
+                        <a:cs typeface="Segoe UI Light" panose="020B0502040204020203" pitchFamily="34" charset="0"/>
+                      </a:endParaRPr>
+                    </a:p>
+                  </a:txBody>
+                  <a:tcPr anchor="ctr"/>
+                </a:tc>
+                <a:tc>
+                  <a:txBody>
+                    <a:bodyPr/>
+                    <a:lstStyle/>
+                    <a:p>
+                      <a:r>
+                        <a:rPr lang="en-US" sz="2400" dirty="0" smtClean="0">
+                          <a:latin typeface="Segoe UI Light" panose="020B0502040204020203" pitchFamily="34" charset="0"/>
+                          <a:cs typeface="Segoe UI Light" panose="020B0502040204020203" pitchFamily="34" charset="0"/>
+                        </a:rPr>
+                        <a:t>06 | </a:t>
+                      </a:r>
+                      <a:r>
+                        <a:rPr lang="en-US" sz="2400" dirty="0" err="1" smtClean="0">
+                          <a:latin typeface="Segoe UI Light" panose="020B0502040204020203" pitchFamily="34" charset="0"/>
+                          <a:cs typeface="Segoe UI Light" panose="020B0502040204020203" pitchFamily="34" charset="0"/>
+                        </a:rPr>
+                        <a:t>ElasticSearch</a:t>
+                      </a:r>
+                      <a:r>
+                        <a:rPr lang="en-US" sz="2400" dirty="0" smtClean="0">
+                          <a:latin typeface="Segoe UI Light" panose="020B0502040204020203" pitchFamily="34" charset="0"/>
+                          <a:cs typeface="Segoe UI Light" panose="020B0502040204020203" pitchFamily="34" charset="0"/>
+                        </a:rPr>
+                        <a:t>,</a:t>
+                      </a:r>
+                      <a:r>
+                        <a:rPr lang="en-US" sz="2400" baseline="0" dirty="0" smtClean="0">
+                          <a:latin typeface="Segoe UI Light" panose="020B0502040204020203" pitchFamily="34" charset="0"/>
+                          <a:cs typeface="Segoe UI Light" panose="020B0502040204020203" pitchFamily="34" charset="0"/>
+                        </a:rPr>
+                        <a:t> </a:t>
+                      </a:r>
+                      <a:r>
+                        <a:rPr lang="en-US" sz="2400" dirty="0" smtClean="0">
+                          <a:latin typeface="Segoe UI Light" panose="020B0502040204020203" pitchFamily="34" charset="0"/>
+                          <a:cs typeface="Segoe UI Light" panose="020B0502040204020203" pitchFamily="34" charset="0"/>
+                        </a:rPr>
+                        <a:t>Docker and YOU</a:t>
+                      </a:r>
+                      <a:endParaRPr lang="en-US" sz="2400" dirty="0">
+                        <a:latin typeface="Segoe UI Light" panose="020B0502040204020203" pitchFamily="34" charset="0"/>
+                        <a:cs typeface="Segoe UI Light" panose="020B0502040204020203" pitchFamily="34" charset="0"/>
+                      </a:endParaRPr>
+                    </a:p>
+                  </a:txBody>
+                  <a:tcPr anchor="ctr"/>
+                </a:tc>
+                <a:extLst>
+                  <a:ext uri="{0D108BD9-81ED-4DB2-BD59-A6C34878D82A}">
+                    <a16:rowId xmlns="" xmlns:a16="http://schemas.microsoft.com/office/drawing/2014/main" val="321066646"/>
+                  </a:ext>
+                </a:extLst>
+              </a:tr>
+              <a:tr h="767632">
+                <a:tc>
+                  <a:txBody>
+                    <a:bodyPr/>
+                    <a:lstStyle/>
+                    <a:p>
+                      <a:pPr marL="0" marR="0" indent="0" algn="l" defTabSz="914088" rtl="0" eaLnBrk="1" fontAlgn="auto" latinLnBrk="0" hangingPunct="1">
+                        <a:lnSpc>
+                          <a:spcPct val="100000"/>
+                        </a:lnSpc>
+                        <a:spcBef>
+                          <a:spcPts val="0"/>
+                        </a:spcBef>
+                        <a:spcAft>
+                          <a:spcPts val="0"/>
+                        </a:spcAft>
+                        <a:buClrTx/>
+                        <a:buSzTx/>
+                        <a:buFontTx/>
+                        <a:buNone/>
+                        <a:tabLst/>
+                        <a:defRPr/>
+                      </a:pPr>
+                      <a:r>
+                        <a:rPr lang="en-US" sz="2400" dirty="0" smtClean="0">
+                          <a:latin typeface="Segoe UI Light" panose="020B0502040204020203" pitchFamily="34" charset="0"/>
+                          <a:cs typeface="Segoe UI Light" panose="020B0502040204020203" pitchFamily="34" charset="0"/>
+                        </a:rPr>
+                        <a:t>03</a:t>
+                      </a:r>
+                      <a:r>
+                        <a:rPr lang="en-US" sz="2400" baseline="0" dirty="0" smtClean="0">
+                          <a:latin typeface="Segoe UI Light" panose="020B0502040204020203" pitchFamily="34" charset="0"/>
+                          <a:cs typeface="Segoe UI Light" panose="020B0502040204020203" pitchFamily="34" charset="0"/>
+                        </a:rPr>
+                        <a:t> | </a:t>
+                      </a:r>
+                      <a:r>
+                        <a:rPr lang="en-US" sz="2400" b="1" baseline="0" dirty="0" smtClean="0">
+                          <a:latin typeface="Segoe UI Light" panose="020B0502040204020203" pitchFamily="34" charset="0"/>
+                          <a:cs typeface="Segoe UI Light" panose="020B0502040204020203" pitchFamily="34" charset="0"/>
+                        </a:rPr>
+                        <a:t>Working with Azure DNS Services</a:t>
+                      </a:r>
+                      <a:endParaRPr lang="en-US" sz="2400" b="1" dirty="0" smtClean="0">
+                        <a:latin typeface="Segoe UI Light" panose="020B0502040204020203" pitchFamily="34" charset="0"/>
+                        <a:cs typeface="Segoe UI Light" panose="020B0502040204020203" pitchFamily="34" charset="0"/>
+                      </a:endParaRPr>
+                    </a:p>
+                  </a:txBody>
+                  <a:tcPr anchor="ctr"/>
+                </a:tc>
+                <a:tc>
+                  <a:txBody>
+                    <a:bodyPr/>
+                    <a:lstStyle/>
+                    <a:p>
+                      <a:r>
+                        <a:rPr lang="en-US" sz="2400" dirty="0" smtClean="0">
+                          <a:latin typeface="Segoe UI Light" panose="020B0502040204020203" pitchFamily="34" charset="0"/>
+                          <a:cs typeface="Segoe UI Light" panose="020B0502040204020203" pitchFamily="34" charset="0"/>
+                        </a:rPr>
+                        <a:t>07 | Scaling Your Application Under Load</a:t>
+                      </a:r>
+                      <a:endParaRPr lang="en-US" sz="2400" dirty="0">
+                        <a:latin typeface="Segoe UI Light" panose="020B0502040204020203" pitchFamily="34" charset="0"/>
+                        <a:cs typeface="Segoe UI Light" panose="020B0502040204020203" pitchFamily="34" charset="0"/>
+                      </a:endParaRPr>
+                    </a:p>
+                  </a:txBody>
+                  <a:tcPr anchor="ctr"/>
+                </a:tc>
+                <a:extLst>
+                  <a:ext uri="{0D108BD9-81ED-4DB2-BD59-A6C34878D82A}">
+                    <a16:rowId xmlns="" xmlns:a16="http://schemas.microsoft.com/office/drawing/2014/main" val="3812060533"/>
+                  </a:ext>
+                </a:extLst>
+              </a:tr>
+              <a:tr h="767632">
+                <a:tc>
+                  <a:txBody>
+                    <a:bodyPr/>
+                    <a:lstStyle/>
+                    <a:p>
+                      <a:r>
+                        <a:rPr lang="en-US" sz="2400" dirty="0" smtClean="0">
+                          <a:latin typeface="Segoe UI Light" panose="020B0502040204020203" pitchFamily="34" charset="0"/>
+                          <a:cs typeface="Segoe UI Light" panose="020B0502040204020203" pitchFamily="34" charset="0"/>
+                        </a:rPr>
+                        <a:t>04 | Executing Large Tasks in the Cloud</a:t>
+                      </a:r>
+                      <a:endParaRPr lang="en-US" sz="2400" dirty="0">
+                        <a:latin typeface="Segoe UI Light" panose="020B0502040204020203" pitchFamily="34" charset="0"/>
+                        <a:cs typeface="Segoe UI Light" panose="020B0502040204020203" pitchFamily="34" charset="0"/>
+                      </a:endParaRPr>
+                    </a:p>
+                  </a:txBody>
+                  <a:tcPr anchor="ctr"/>
+                </a:tc>
+                <a:tc>
+                  <a:txBody>
+                    <a:bodyPr/>
+                    <a:lstStyle/>
+                    <a:p>
+                      <a:r>
+                        <a:rPr lang="en-US" sz="2400" dirty="0" smtClean="0">
+                          <a:latin typeface="Segoe UI Light" panose="020B0502040204020203" pitchFamily="34" charset="0"/>
+                          <a:cs typeface="Segoe UI Light" panose="020B0502040204020203" pitchFamily="34" charset="0"/>
+                        </a:rPr>
+                        <a:t>08 | Rewind</a:t>
+                      </a:r>
+                      <a:endParaRPr lang="en-US" sz="2400" dirty="0">
+                        <a:latin typeface="Segoe UI Light" panose="020B0502040204020203" pitchFamily="34" charset="0"/>
+                        <a:cs typeface="Segoe UI Light" panose="020B0502040204020203" pitchFamily="34" charset="0"/>
+                      </a:endParaRPr>
+                    </a:p>
+                  </a:txBody>
+                  <a:tcPr anchor="ctr"/>
+                </a:tc>
+                <a:extLst>
+                  <a:ext uri="{0D108BD9-81ED-4DB2-BD59-A6C34878D82A}">
+                    <a16:rowId xmlns="" xmlns:a16="http://schemas.microsoft.com/office/drawing/2014/main" val="733235577"/>
+                  </a:ext>
+                </a:extLst>
+              </a:tr>
+            </a:tbl>
+          </a:graphicData>
+        </a:graphic>
+      </p:graphicFrame>
+    </p:spTree>
+    <p:extLst>
+      <p:ext uri="{BB962C8B-B14F-4D97-AF65-F5344CB8AC3E}">
+        <p14:creationId xmlns:p14="http://schemas.microsoft.com/office/powerpoint/2010/main" val="3030310655"/>
+      </p:ext>
+    </p:extLst>
+  </p:cSld>
+  <p:clrMapOvr>
+    <a:masterClrMapping/>
+  </p:clrMapOvr>
+  <mc:AlternateContent xmlns:mc="http://schemas.openxmlformats.org/markup-compatibility/2006">
+    <mc:Choice xmlns:p14="http://schemas.microsoft.com/office/powerpoint/2010/main" Requires="p14">
+      <p:transition spd="slow" p14:dur="2000"/>
+    </mc:Choice>
+    <mc:Fallback>
+      <p:transition spd="slow"/>
+    </mc:Fallback>
+  </mc:AlternateContent>
+  <p:timing>
+    <p:tnLst>
+      <p:par>
+        <p:cTn id="1" dur="indefinite" restart="never" nodeType="tmRoot"/>
+      </p:par>
+    </p:tnLst>
+  </p:timing>
+</p:sld>
+</file>
+
+<file path=ppt/slides/slide4.xml><?xml version="1.0" encoding="utf-8"?>
+<p:sld xmlns:a="http://schemas.openxmlformats.org/drawingml/2006/main" xmlns:r="http://schemas.openxmlformats.org/officeDocument/2006/relationships" xmlns:p="http://schemas.openxmlformats.org/presentationml/2006/main">
+  <p:cSld>
+    <p:spTree>
+      <p:nvGrpSpPr>
+        <p:cNvPr id="1" name=""/>
+        <p:cNvGrpSpPr/>
+        <p:nvPr/>
+      </p:nvGrpSpPr>
+      <p:grpSpPr>
+        <a:xfrm>
+          <a:off x="0" y="0"/>
+          <a:ext cx="0" cy="0"/>
+          <a:chOff x="0" y="0"/>
+          <a:chExt cx="0" cy="0"/>
+        </a:xfrm>
+      </p:grpSpPr>
+      <p:sp>
+        <p:nvSpPr>
+          <p:cNvPr id="7" name="Content Placeholder 6"/>
           <p:cNvSpPr>
             <a:spLocks noGrp="1"/>
           </p:cNvSpPr>
@@ -3976,16 +6368,65 @@
         </p:nvSpPr>
         <p:spPr/>
         <p:txBody>
+          <a:bodyPr>
+            <a:normAutofit/>
+          </a:bodyPr>
+          <a:lstStyle/>
+          <a:p>
+            <a:r>
+              <a:rPr lang="en-GB" dirty="0" smtClean="0"/>
+              <a:t>DNS Basics</a:t>
+            </a:r>
+            <a:endParaRPr lang="en-GB" dirty="0" smtClean="0"/>
+          </a:p>
+          <a:p>
+            <a:r>
+              <a:rPr lang="en-GB" dirty="0" smtClean="0"/>
+              <a:t>Configuring DNS</a:t>
+            </a:r>
+          </a:p>
+          <a:p>
+            <a:r>
+              <a:rPr lang="en-GB" dirty="0" smtClean="0"/>
+              <a:t>DNS in Azure</a:t>
+            </a:r>
+            <a:endParaRPr lang="en-GB" dirty="0" smtClean="0"/>
+          </a:p>
+          <a:p>
+            <a:r>
+              <a:rPr lang="en-GB" dirty="0" smtClean="0"/>
+              <a:t>Programmatic DNS Management</a:t>
+            </a:r>
+            <a:endParaRPr lang="en-GB" dirty="0"/>
+          </a:p>
+        </p:txBody>
+      </p:sp>
+      <p:sp>
+        <p:nvSpPr>
+          <p:cNvPr id="2" name="Title 1"/>
+          <p:cNvSpPr>
+            <a:spLocks noGrp="1"/>
+          </p:cNvSpPr>
+          <p:nvPr>
+            <p:ph type="title"/>
+          </p:nvPr>
+        </p:nvSpPr>
+        <p:spPr/>
+        <p:txBody>
           <a:bodyPr/>
           <a:lstStyle/>
           <a:p>
+            <a:r>
+              <a:rPr lang="en-US" dirty="0"/>
+              <a:t>Working with Azure DNS Services</a:t>
+            </a:r>
             <a:endParaRPr lang="en-US" dirty="0"/>
           </a:p>
         </p:txBody>
       </p:sp>
       <p:sp>
         <p:nvSpPr>
-          <p:cNvPr id="4" name="TextBox 3"/>
+          <p:cNvPr id="5" name="TextBox 4"/>
           <p:cNvSpPr txBox="1"/>
           <p:nvPr/>
         </p:nvSpPr>
@@ -4033,7 +6474,1760 @@
     </p:spTree>
     <p:extLst>
       <p:ext uri="{BB962C8B-B14F-4D97-AF65-F5344CB8AC3E}">
+        <p14:creationId xmlns:p14="http://schemas.microsoft.com/office/powerpoint/2010/main" val="318349970"/>
+      </p:ext>
+    </p:extLst>
+  </p:cSld>
+  <p:clrMapOvr>
+    <a:masterClrMapping/>
+  </p:clrMapOvr>
+  <p:timing>
+    <p:tnLst>
+      <p:par>
+        <p:cTn id="1" dur="indefinite" restart="never" nodeType="tmRoot"/>
+      </p:par>
+    </p:tnLst>
+  </p:timing>
+</p:sld>
+</file>
+
+<file path=ppt/slides/slide5.xml><?xml version="1.0" encoding="utf-8"?>
+<p:sld xmlns:a="http://schemas.openxmlformats.org/drawingml/2006/main" xmlns:r="http://schemas.openxmlformats.org/officeDocument/2006/relationships" xmlns:p="http://schemas.openxmlformats.org/presentationml/2006/main">
+  <p:cSld>
+    <p:spTree>
+      <p:nvGrpSpPr>
+        <p:cNvPr id="1" name=""/>
+        <p:cNvGrpSpPr/>
+        <p:nvPr/>
+      </p:nvGrpSpPr>
+      <p:grpSpPr>
+        <a:xfrm>
+          <a:off x="0" y="0"/>
+          <a:ext cx="0" cy="0"/>
+          <a:chOff x="0" y="0"/>
+          <a:chExt cx="0" cy="0"/>
+        </a:xfrm>
+      </p:grpSpPr>
+      <p:sp>
+        <p:nvSpPr>
+          <p:cNvPr id="2" name="Title 1"/>
+          <p:cNvSpPr>
+            <a:spLocks noGrp="1"/>
+          </p:cNvSpPr>
+          <p:nvPr>
+            <p:ph type="title"/>
+          </p:nvPr>
+        </p:nvSpPr>
+        <p:spPr/>
+        <p:txBody>
+          <a:bodyPr/>
+          <a:lstStyle/>
+          <a:p>
+            <a:r>
+              <a:rPr lang="en-US" dirty="0" smtClean="0"/>
+              <a:t>Terminology</a:t>
+            </a:r>
+            <a:endParaRPr lang="en-US" dirty="0"/>
+          </a:p>
+        </p:txBody>
+      </p:sp>
+      <p:sp>
+        <p:nvSpPr>
+          <p:cNvPr id="4" name="TextBox 3"/>
+          <p:cNvSpPr txBox="1"/>
+          <p:nvPr/>
+        </p:nvSpPr>
+        <p:spPr>
+          <a:xfrm>
+            <a:off x="9906000" y="-1"/>
+            <a:ext cx="2286000" cy="2031325"/>
+          </a:xfrm>
+          <a:prstGeom prst="rect">
+            <a:avLst/>
+          </a:prstGeom>
+          <a:solidFill>
+            <a:srgbClr val="FFFF00"/>
+          </a:solidFill>
+          <a:ln>
+            <a:noFill/>
+          </a:ln>
+        </p:spPr>
+        <p:txBody>
+          <a:bodyPr wrap="square" rtlCol="0">
+            <a:spAutoFit/>
+          </a:bodyPr>
+          <a:lstStyle/>
+          <a:p>
+            <a:pPr algn="ctr"/>
+            <a:endParaRPr lang="en-US" dirty="0" smtClean="0"/>
+          </a:p>
+          <a:p>
+            <a:pPr algn="ctr"/>
+            <a:endParaRPr lang="en-US" dirty="0"/>
+          </a:p>
+          <a:p>
+            <a:pPr algn="ctr"/>
+            <a:r>
+              <a:rPr lang="en-US" dirty="0" smtClean="0"/>
+              <a:t>Please leave this area blank to allow for picture in picture recording</a:t>
+            </a:r>
+          </a:p>
+          <a:p>
+            <a:pPr algn="ctr"/>
+            <a:endParaRPr lang="en-US" dirty="0"/>
+          </a:p>
+        </p:txBody>
+      </p:sp>
+      <p:sp>
+        <p:nvSpPr>
+          <p:cNvPr id="5" name="Content Placeholder 6"/>
+          <p:cNvSpPr>
+            <a:spLocks noGrp="1"/>
+          </p:cNvSpPr>
+          <p:nvPr>
+            <p:ph sz="quarter" idx="10"/>
+          </p:nvPr>
+        </p:nvSpPr>
+        <p:spPr>
+          <a:xfrm>
+            <a:off x="379413" y="1388226"/>
+            <a:ext cx="11525250" cy="5290388"/>
+          </a:xfrm>
+        </p:spPr>
+        <p:txBody>
+          <a:bodyPr>
+            <a:normAutofit/>
+          </a:bodyPr>
+          <a:lstStyle/>
+          <a:p>
+            <a:r>
+              <a:rPr lang="en-GB" dirty="0" smtClean="0"/>
+              <a:t>DNS: Domain Name System</a:t>
+            </a:r>
+          </a:p>
+          <a:p>
+            <a:r>
+              <a:rPr lang="en-GB" dirty="0" smtClean="0"/>
+              <a:t>Registrar</a:t>
+            </a:r>
+          </a:p>
+          <a:p>
+            <a:r>
+              <a:rPr lang="en-GB" dirty="0" smtClean="0"/>
+              <a:t>TTL: time to live</a:t>
+            </a:r>
+          </a:p>
+          <a:p>
+            <a:r>
+              <a:rPr lang="en-GB" dirty="0" smtClean="0"/>
+              <a:t>Zones</a:t>
+            </a:r>
+          </a:p>
+          <a:p>
+            <a:r>
+              <a:rPr lang="en-GB" dirty="0" err="1" smtClean="0"/>
+              <a:t>Recordsets</a:t>
+            </a:r>
+            <a:r>
+              <a:rPr lang="en-GB" dirty="0" smtClean="0"/>
+              <a:t> and records</a:t>
+            </a:r>
+          </a:p>
+          <a:p>
+            <a:r>
+              <a:rPr lang="en-GB" dirty="0" smtClean="0"/>
+              <a:t>TLD, SLD, extensions, domains, hosts</a:t>
+            </a:r>
+            <a:endParaRPr lang="en-GB" dirty="0"/>
+          </a:p>
+        </p:txBody>
+      </p:sp>
+    </p:spTree>
+    <p:extLst>
+      <p:ext uri="{BB962C8B-B14F-4D97-AF65-F5344CB8AC3E}">
+        <p14:creationId xmlns:p14="http://schemas.microsoft.com/office/powerpoint/2010/main" val="3968294063"/>
+      </p:ext>
+    </p:extLst>
+  </p:cSld>
+  <p:clrMapOvr>
+    <a:masterClrMapping/>
+  </p:clrMapOvr>
+  <p:timing>
+    <p:tnLst>
+      <p:par>
+        <p:cTn id="1" dur="indefinite" restart="never" nodeType="tmRoot">
+          <p:childTnLst>
+            <p:seq concurrent="1" nextAc="seek">
+              <p:cTn id="2" dur="indefinite" nodeType="mainSeq">
+                <p:childTnLst>
+                  <p:par>
+                    <p:cTn id="3" fill="hold">
+                      <p:stCondLst>
+                        <p:cond delay="indefinite"/>
+                      </p:stCondLst>
+                      <p:childTnLst>
+                        <p:par>
+                          <p:cTn id="4" fill="hold">
+                            <p:stCondLst>
+                              <p:cond delay="0"/>
+                            </p:stCondLst>
+                            <p:childTnLst>
+                              <p:par>
+                                <p:cTn id="5" presetID="1" presetClass="entr" presetSubtype="0" fill="hold" nodeType="clickEffect">
+                                  <p:stCondLst>
+                                    <p:cond delay="0"/>
+                                  </p:stCondLst>
+                                  <p:childTnLst>
+                                    <p:set>
+                                      <p:cBhvr>
+                                        <p:cTn id="6" dur="1" fill="hold">
+                                          <p:stCondLst>
+                                            <p:cond delay="0"/>
+                                          </p:stCondLst>
+                                        </p:cTn>
+                                        <p:tgtEl>
+                                          <p:spTgt spid="5">
+                                            <p:txEl>
+                                              <p:pRg st="0" end="0"/>
+                                            </p:txEl>
+                                          </p:spTgt>
+                                        </p:tgtEl>
+                                        <p:attrNameLst>
+                                          <p:attrName>style.visibility</p:attrName>
+                                        </p:attrNameLst>
+                                      </p:cBhvr>
+                                      <p:to>
+                                        <p:strVal val="visible"/>
+                                      </p:to>
+                                    </p:set>
+                                  </p:childTnLst>
+                                </p:cTn>
+                              </p:par>
+                            </p:childTnLst>
+                          </p:cTn>
+                        </p:par>
+                      </p:childTnLst>
+                    </p:cTn>
+                  </p:par>
+                  <p:par>
+                    <p:cTn id="7" fill="hold">
+                      <p:stCondLst>
+                        <p:cond delay="indefinite"/>
+                      </p:stCondLst>
+                      <p:childTnLst>
+                        <p:par>
+                          <p:cTn id="8" fill="hold">
+                            <p:stCondLst>
+                              <p:cond delay="0"/>
+                            </p:stCondLst>
+                            <p:childTnLst>
+                              <p:par>
+                                <p:cTn id="9" presetID="1" presetClass="entr" presetSubtype="0" fill="hold" nodeType="clickEffect">
+                                  <p:stCondLst>
+                                    <p:cond delay="0"/>
+                                  </p:stCondLst>
+                                  <p:childTnLst>
+                                    <p:set>
+                                      <p:cBhvr>
+                                        <p:cTn id="10" dur="1" fill="hold">
+                                          <p:stCondLst>
+                                            <p:cond delay="0"/>
+                                          </p:stCondLst>
+                                        </p:cTn>
+                                        <p:tgtEl>
+                                          <p:spTgt spid="5">
+                                            <p:txEl>
+                                              <p:pRg st="1" end="1"/>
+                                            </p:txEl>
+                                          </p:spTgt>
+                                        </p:tgtEl>
+                                        <p:attrNameLst>
+                                          <p:attrName>style.visibility</p:attrName>
+                                        </p:attrNameLst>
+                                      </p:cBhvr>
+                                      <p:to>
+                                        <p:strVal val="visible"/>
+                                      </p:to>
+                                    </p:set>
+                                  </p:childTnLst>
+                                </p:cTn>
+                              </p:par>
+                            </p:childTnLst>
+                          </p:cTn>
+                        </p:par>
+                      </p:childTnLst>
+                    </p:cTn>
+                  </p:par>
+                  <p:par>
+                    <p:cTn id="11" fill="hold">
+                      <p:stCondLst>
+                        <p:cond delay="indefinite"/>
+                      </p:stCondLst>
+                      <p:childTnLst>
+                        <p:par>
+                          <p:cTn id="12" fill="hold">
+                            <p:stCondLst>
+                              <p:cond delay="0"/>
+                            </p:stCondLst>
+                            <p:childTnLst>
+                              <p:par>
+                                <p:cTn id="13" presetID="1" presetClass="entr" presetSubtype="0" fill="hold" nodeType="clickEffect">
+                                  <p:stCondLst>
+                                    <p:cond delay="0"/>
+                                  </p:stCondLst>
+                                  <p:childTnLst>
+                                    <p:set>
+                                      <p:cBhvr>
+                                        <p:cTn id="14" dur="1" fill="hold">
+                                          <p:stCondLst>
+                                            <p:cond delay="0"/>
+                                          </p:stCondLst>
+                                        </p:cTn>
+                                        <p:tgtEl>
+                                          <p:spTgt spid="5">
+                                            <p:txEl>
+                                              <p:pRg st="2" end="2"/>
+                                            </p:txEl>
+                                          </p:spTgt>
+                                        </p:tgtEl>
+                                        <p:attrNameLst>
+                                          <p:attrName>style.visibility</p:attrName>
+                                        </p:attrNameLst>
+                                      </p:cBhvr>
+                                      <p:to>
+                                        <p:strVal val="visible"/>
+                                      </p:to>
+                                    </p:set>
+                                  </p:childTnLst>
+                                </p:cTn>
+                              </p:par>
+                            </p:childTnLst>
+                          </p:cTn>
+                        </p:par>
+                      </p:childTnLst>
+                    </p:cTn>
+                  </p:par>
+                  <p:par>
+                    <p:cTn id="15" fill="hold">
+                      <p:stCondLst>
+                        <p:cond delay="indefinite"/>
+                      </p:stCondLst>
+                      <p:childTnLst>
+                        <p:par>
+                          <p:cTn id="16" fill="hold">
+                            <p:stCondLst>
+                              <p:cond delay="0"/>
+                            </p:stCondLst>
+                            <p:childTnLst>
+                              <p:par>
+                                <p:cTn id="17" presetID="1" presetClass="entr" presetSubtype="0" fill="hold" nodeType="clickEffect">
+                                  <p:stCondLst>
+                                    <p:cond delay="0"/>
+                                  </p:stCondLst>
+                                  <p:childTnLst>
+                                    <p:set>
+                                      <p:cBhvr>
+                                        <p:cTn id="18" dur="1" fill="hold">
+                                          <p:stCondLst>
+                                            <p:cond delay="0"/>
+                                          </p:stCondLst>
+                                        </p:cTn>
+                                        <p:tgtEl>
+                                          <p:spTgt spid="5">
+                                            <p:txEl>
+                                              <p:pRg st="3" end="3"/>
+                                            </p:txEl>
+                                          </p:spTgt>
+                                        </p:tgtEl>
+                                        <p:attrNameLst>
+                                          <p:attrName>style.visibility</p:attrName>
+                                        </p:attrNameLst>
+                                      </p:cBhvr>
+                                      <p:to>
+                                        <p:strVal val="visible"/>
+                                      </p:to>
+                                    </p:set>
+                                  </p:childTnLst>
+                                </p:cTn>
+                              </p:par>
+                            </p:childTnLst>
+                          </p:cTn>
+                        </p:par>
+                      </p:childTnLst>
+                    </p:cTn>
+                  </p:par>
+                  <p:par>
+                    <p:cTn id="19" fill="hold">
+                      <p:stCondLst>
+                        <p:cond delay="indefinite"/>
+                      </p:stCondLst>
+                      <p:childTnLst>
+                        <p:par>
+                          <p:cTn id="20" fill="hold">
+                            <p:stCondLst>
+                              <p:cond delay="0"/>
+                            </p:stCondLst>
+                            <p:childTnLst>
+                              <p:par>
+                                <p:cTn id="21" presetID="1" presetClass="entr" presetSubtype="0" fill="hold" nodeType="clickEffect">
+                                  <p:stCondLst>
+                                    <p:cond delay="0"/>
+                                  </p:stCondLst>
+                                  <p:childTnLst>
+                                    <p:set>
+                                      <p:cBhvr>
+                                        <p:cTn id="22" dur="1" fill="hold">
+                                          <p:stCondLst>
+                                            <p:cond delay="0"/>
+                                          </p:stCondLst>
+                                        </p:cTn>
+                                        <p:tgtEl>
+                                          <p:spTgt spid="5">
+                                            <p:txEl>
+                                              <p:pRg st="4" end="4"/>
+                                            </p:txEl>
+                                          </p:spTgt>
+                                        </p:tgtEl>
+                                        <p:attrNameLst>
+                                          <p:attrName>style.visibility</p:attrName>
+                                        </p:attrNameLst>
+                                      </p:cBhvr>
+                                      <p:to>
+                                        <p:strVal val="visible"/>
+                                      </p:to>
+                                    </p:set>
+                                  </p:childTnLst>
+                                </p:cTn>
+                              </p:par>
+                            </p:childTnLst>
+                          </p:cTn>
+                        </p:par>
+                      </p:childTnLst>
+                    </p:cTn>
+                  </p:par>
+                  <p:par>
+                    <p:cTn id="23" fill="hold">
+                      <p:stCondLst>
+                        <p:cond delay="indefinite"/>
+                      </p:stCondLst>
+                      <p:childTnLst>
+                        <p:par>
+                          <p:cTn id="24" fill="hold">
+                            <p:stCondLst>
+                              <p:cond delay="0"/>
+                            </p:stCondLst>
+                            <p:childTnLst>
+                              <p:par>
+                                <p:cTn id="25" presetID="1" presetClass="entr" presetSubtype="0" fill="hold" nodeType="clickEffect">
+                                  <p:stCondLst>
+                                    <p:cond delay="0"/>
+                                  </p:stCondLst>
+                                  <p:childTnLst>
+                                    <p:set>
+                                      <p:cBhvr>
+                                        <p:cTn id="26" dur="1" fill="hold">
+                                          <p:stCondLst>
+                                            <p:cond delay="0"/>
+                                          </p:stCondLst>
+                                        </p:cTn>
+                                        <p:tgtEl>
+                                          <p:spTgt spid="5">
+                                            <p:txEl>
+                                              <p:pRg st="5" end="5"/>
+                                            </p:txEl>
+                                          </p:spTgt>
+                                        </p:tgtEl>
+                                        <p:attrNameLst>
+                                          <p:attrName>style.visibility</p:attrName>
+                                        </p:attrNameLst>
+                                      </p:cBhvr>
+                                      <p:to>
+                                        <p:strVal val="visible"/>
+                                      </p:to>
+                                    </p:set>
+                                  </p:childTnLst>
+                                </p:cTn>
+                              </p:par>
+                            </p:childTnLst>
+                          </p:cTn>
+                        </p:par>
+                      </p:childTnLst>
+                    </p:cTn>
+                  </p:par>
+                </p:childTnLst>
+              </p:cTn>
+              <p:prevCondLst>
+                <p:cond evt="onPrev" delay="0">
+                  <p:tgtEl>
+                    <p:sldTgt/>
+                  </p:tgtEl>
+                </p:cond>
+              </p:prevCondLst>
+              <p:nextCondLst>
+                <p:cond evt="onNext" delay="0">
+                  <p:tgtEl>
+                    <p:sldTgt/>
+                  </p:tgtEl>
+                </p:cond>
+              </p:nextCondLst>
+            </p:seq>
+          </p:childTnLst>
+        </p:cTn>
+      </p:par>
+    </p:tnLst>
+  </p:timing>
+</p:sld>
+</file>
+
+<file path=ppt/slides/slide6.xml><?xml version="1.0" encoding="utf-8"?>
+<p:sld xmlns:a="http://schemas.openxmlformats.org/drawingml/2006/main" xmlns:r="http://schemas.openxmlformats.org/officeDocument/2006/relationships" xmlns:p="http://schemas.openxmlformats.org/presentationml/2006/main">
+  <p:cSld>
+    <p:spTree>
+      <p:nvGrpSpPr>
+        <p:cNvPr id="1" name=""/>
+        <p:cNvGrpSpPr/>
+        <p:nvPr/>
+      </p:nvGrpSpPr>
+      <p:grpSpPr>
+        <a:xfrm>
+          <a:off x="0" y="0"/>
+          <a:ext cx="0" cy="0"/>
+          <a:chOff x="0" y="0"/>
+          <a:chExt cx="0" cy="0"/>
+        </a:xfrm>
+      </p:grpSpPr>
+      <p:sp>
+        <p:nvSpPr>
+          <p:cNvPr id="10" name="Rectangle 9"/>
+          <p:cNvSpPr/>
+          <p:nvPr/>
+        </p:nvSpPr>
+        <p:spPr>
+          <a:xfrm>
+            <a:off x="3157538" y="3643085"/>
+            <a:ext cx="8882062" cy="1625601"/>
+          </a:xfrm>
+          <a:prstGeom prst="rect">
+            <a:avLst/>
+          </a:prstGeom>
+          <a:solidFill>
+            <a:schemeClr val="accent4">
+              <a:alpha val="32000"/>
+            </a:schemeClr>
+          </a:solidFill>
+          <a:ln>
+            <a:solidFill>
+              <a:schemeClr val="accent4">
+                <a:shade val="50000"/>
+                <a:alpha val="13000"/>
+              </a:schemeClr>
+            </a:solidFill>
+          </a:ln>
+        </p:spPr>
+        <p:style>
+          <a:lnRef idx="2">
+            <a:schemeClr val="accent4">
+              <a:shade val="50000"/>
+            </a:schemeClr>
+          </a:lnRef>
+          <a:fillRef idx="1">
+            <a:schemeClr val="accent4"/>
+          </a:fillRef>
+          <a:effectRef idx="0">
+            <a:schemeClr val="accent4"/>
+          </a:effectRef>
+          <a:fontRef idx="minor">
+            <a:schemeClr val="lt1"/>
+          </a:fontRef>
+        </p:style>
+        <p:txBody>
+          <a:bodyPr rtlCol="0" anchor="ctr"/>
+          <a:lstStyle/>
+          <a:p>
+            <a:pPr algn="ctr"/>
+            <a:endParaRPr lang="en-US"/>
+          </a:p>
+        </p:txBody>
+      </p:sp>
+      <p:sp>
+        <p:nvSpPr>
+          <p:cNvPr id="2" name="Title 1"/>
+          <p:cNvSpPr>
+            <a:spLocks noGrp="1"/>
+          </p:cNvSpPr>
+          <p:nvPr>
+            <p:ph type="title"/>
+          </p:nvPr>
+        </p:nvSpPr>
+        <p:spPr/>
+        <p:txBody>
+          <a:bodyPr/>
+          <a:lstStyle/>
+          <a:p>
+            <a:r>
+              <a:rPr lang="en-US" dirty="0" smtClean="0"/>
+              <a:t>DNS Basics</a:t>
+            </a:r>
+            <a:endParaRPr lang="en-US" dirty="0"/>
+          </a:p>
+        </p:txBody>
+      </p:sp>
+      <p:sp>
+        <p:nvSpPr>
+          <p:cNvPr id="4" name="TextBox 3"/>
+          <p:cNvSpPr txBox="1"/>
+          <p:nvPr/>
+        </p:nvSpPr>
+        <p:spPr>
+          <a:xfrm>
+            <a:off x="9906000" y="-1"/>
+            <a:ext cx="2286000" cy="2031325"/>
+          </a:xfrm>
+          <a:prstGeom prst="rect">
+            <a:avLst/>
+          </a:prstGeom>
+          <a:solidFill>
+            <a:srgbClr val="FFFF00"/>
+          </a:solidFill>
+          <a:ln>
+            <a:noFill/>
+          </a:ln>
+        </p:spPr>
+        <p:txBody>
+          <a:bodyPr wrap="square" rtlCol="0">
+            <a:spAutoFit/>
+          </a:bodyPr>
+          <a:lstStyle/>
+          <a:p>
+            <a:pPr algn="ctr"/>
+            <a:endParaRPr lang="en-US" dirty="0" smtClean="0"/>
+          </a:p>
+          <a:p>
+            <a:pPr algn="ctr"/>
+            <a:endParaRPr lang="en-US" dirty="0"/>
+          </a:p>
+          <a:p>
+            <a:pPr algn="ctr"/>
+            <a:r>
+              <a:rPr lang="en-US" dirty="0" smtClean="0"/>
+              <a:t>Please leave this area blank to allow for picture in picture recording</a:t>
+            </a:r>
+          </a:p>
+          <a:p>
+            <a:pPr algn="ctr"/>
+            <a:endParaRPr lang="en-US" dirty="0"/>
+          </a:p>
+        </p:txBody>
+      </p:sp>
+      <p:sp>
+        <p:nvSpPr>
+          <p:cNvPr id="5" name="Rounded Rectangle 4"/>
+          <p:cNvSpPr/>
+          <p:nvPr/>
+        </p:nvSpPr>
+        <p:spPr>
+          <a:xfrm>
+            <a:off x="379313" y="3781960"/>
+            <a:ext cx="2653347" cy="1356360"/>
+          </a:xfrm>
+          <a:prstGeom prst="roundRect">
+            <a:avLst/>
+          </a:prstGeom>
+        </p:spPr>
+        <p:style>
+          <a:lnRef idx="2">
+            <a:schemeClr val="accent2">
+              <a:shade val="50000"/>
+            </a:schemeClr>
+          </a:lnRef>
+          <a:fillRef idx="1">
+            <a:schemeClr val="accent2"/>
+          </a:fillRef>
+          <a:effectRef idx="0">
+            <a:schemeClr val="accent2"/>
+          </a:effectRef>
+          <a:fontRef idx="minor">
+            <a:schemeClr val="lt1"/>
+          </a:fontRef>
+        </p:style>
+        <p:txBody>
+          <a:bodyPr rtlCol="0" anchor="ctr"/>
+          <a:lstStyle/>
+          <a:p>
+            <a:pPr algn="ctr"/>
+            <a:r>
+              <a:rPr lang="en-US" sz="5400" dirty="0" smtClean="0"/>
+              <a:t>joe</a:t>
+            </a:r>
+            <a:endParaRPr lang="en-US" sz="5400" dirty="0"/>
+          </a:p>
+        </p:txBody>
+      </p:sp>
+      <p:sp>
+        <p:nvSpPr>
+          <p:cNvPr id="6" name="Rounded Rectangle 5"/>
+          <p:cNvSpPr/>
+          <p:nvPr/>
+        </p:nvSpPr>
+        <p:spPr>
+          <a:xfrm>
+            <a:off x="3261260" y="3781960"/>
+            <a:ext cx="5852160" cy="1356360"/>
+          </a:xfrm>
+          <a:prstGeom prst="roundRect">
+            <a:avLst/>
+          </a:prstGeom>
+        </p:spPr>
+        <p:style>
+          <a:lnRef idx="2">
+            <a:schemeClr val="accent6">
+              <a:shade val="50000"/>
+            </a:schemeClr>
+          </a:lnRef>
+          <a:fillRef idx="1">
+            <a:schemeClr val="accent6"/>
+          </a:fillRef>
+          <a:effectRef idx="0">
+            <a:schemeClr val="accent6"/>
+          </a:effectRef>
+          <a:fontRef idx="minor">
+            <a:schemeClr val="lt1"/>
+          </a:fontRef>
+        </p:style>
+        <p:txBody>
+          <a:bodyPr rtlCol="0" anchor="ctr"/>
+          <a:lstStyle/>
+          <a:p>
+            <a:pPr algn="ctr"/>
+            <a:r>
+              <a:rPr lang="en-US" sz="5400" dirty="0" err="1" smtClean="0"/>
+              <a:t>imagenomnom</a:t>
+            </a:r>
+            <a:endParaRPr lang="en-US" sz="5400" dirty="0"/>
+          </a:p>
+        </p:txBody>
+      </p:sp>
+      <p:sp>
+        <p:nvSpPr>
+          <p:cNvPr id="7" name="Rounded Rectangle 6"/>
+          <p:cNvSpPr/>
+          <p:nvPr/>
+        </p:nvSpPr>
+        <p:spPr>
+          <a:xfrm>
+            <a:off x="9342019" y="3781960"/>
+            <a:ext cx="2561927" cy="1356360"/>
+          </a:xfrm>
+          <a:prstGeom prst="roundRect">
+            <a:avLst/>
+          </a:prstGeom>
+        </p:spPr>
+        <p:style>
+          <a:lnRef idx="2">
+            <a:schemeClr val="accent5">
+              <a:shade val="50000"/>
+            </a:schemeClr>
+          </a:lnRef>
+          <a:fillRef idx="1">
+            <a:schemeClr val="accent5"/>
+          </a:fillRef>
+          <a:effectRef idx="0">
+            <a:schemeClr val="accent5"/>
+          </a:effectRef>
+          <a:fontRef idx="minor">
+            <a:schemeClr val="lt1"/>
+          </a:fontRef>
+        </p:style>
+        <p:txBody>
+          <a:bodyPr rtlCol="0" anchor="ctr"/>
+          <a:lstStyle/>
+          <a:p>
+            <a:pPr algn="ctr"/>
+            <a:r>
+              <a:rPr lang="en-US" sz="5400" dirty="0" smtClean="0"/>
+              <a:t>com</a:t>
+            </a:r>
+            <a:endParaRPr lang="en-US" sz="5400" dirty="0"/>
+          </a:p>
+        </p:txBody>
+      </p:sp>
+      <p:sp>
+        <p:nvSpPr>
+          <p:cNvPr id="8" name="TextBox 7"/>
+          <p:cNvSpPr txBox="1"/>
+          <p:nvPr/>
+        </p:nvSpPr>
+        <p:spPr>
+          <a:xfrm>
+            <a:off x="1943144" y="2009957"/>
+            <a:ext cx="8397171" cy="1107996"/>
+          </a:xfrm>
+          <a:prstGeom prst="rect">
+            <a:avLst/>
+          </a:prstGeom>
+          <a:noFill/>
+        </p:spPr>
+        <p:txBody>
+          <a:bodyPr wrap="none" rtlCol="0">
+            <a:spAutoFit/>
+          </a:bodyPr>
+          <a:lstStyle/>
+          <a:p>
+            <a:r>
+              <a:rPr lang="en-US" sz="6600" dirty="0" smtClean="0"/>
+              <a:t>joe.imagenomnom.com</a:t>
+            </a:r>
+            <a:endParaRPr lang="en-US" sz="6600" dirty="0"/>
+          </a:p>
+        </p:txBody>
+      </p:sp>
+    </p:spTree>
+    <p:extLst>
+      <p:ext uri="{BB962C8B-B14F-4D97-AF65-F5344CB8AC3E}">
         <p14:creationId xmlns:p14="http://schemas.microsoft.com/office/powerpoint/2010/main" val="255798916"/>
+      </p:ext>
+    </p:extLst>
+  </p:cSld>
+  <p:clrMapOvr>
+    <a:masterClrMapping/>
+  </p:clrMapOvr>
+  <p:timing>
+    <p:tnLst>
+      <p:par>
+        <p:cTn id="1" dur="indefinite" restart="never" nodeType="tmRoot">
+          <p:childTnLst>
+            <p:seq concurrent="1" nextAc="seek">
+              <p:cTn id="2" dur="indefinite" nodeType="mainSeq">
+                <p:childTnLst>
+                  <p:par>
+                    <p:cTn id="3" fill="hold">
+                      <p:stCondLst>
+                        <p:cond delay="indefinite"/>
+                      </p:stCondLst>
+                      <p:childTnLst>
+                        <p:par>
+                          <p:cTn id="4" fill="hold">
+                            <p:stCondLst>
+                              <p:cond delay="0"/>
+                            </p:stCondLst>
+                            <p:childTnLst>
+                              <p:par>
+                                <p:cTn id="5" presetID="1" presetClass="entr" presetSubtype="0" fill="hold" grpId="1" nodeType="clickEffect">
+                                  <p:stCondLst>
+                                    <p:cond delay="0"/>
+                                  </p:stCondLst>
+                                  <p:childTnLst>
+                                    <p:set>
+                                      <p:cBhvr>
+                                        <p:cTn id="6" dur="1" fill="hold">
+                                          <p:stCondLst>
+                                            <p:cond delay="0"/>
+                                          </p:stCondLst>
+                                        </p:cTn>
+                                        <p:tgtEl>
+                                          <p:spTgt spid="7"/>
+                                        </p:tgtEl>
+                                        <p:attrNameLst>
+                                          <p:attrName>style.visibility</p:attrName>
+                                        </p:attrNameLst>
+                                      </p:cBhvr>
+                                      <p:to>
+                                        <p:strVal val="visible"/>
+                                      </p:to>
+                                    </p:set>
+                                  </p:childTnLst>
+                                </p:cTn>
+                              </p:par>
+                            </p:childTnLst>
+                          </p:cTn>
+                        </p:par>
+                      </p:childTnLst>
+                    </p:cTn>
+                  </p:par>
+                  <p:par>
+                    <p:cTn id="7" fill="hold">
+                      <p:stCondLst>
+                        <p:cond delay="indefinite"/>
+                      </p:stCondLst>
+                      <p:childTnLst>
+                        <p:par>
+                          <p:cTn id="8" fill="hold">
+                            <p:stCondLst>
+                              <p:cond delay="0"/>
+                            </p:stCondLst>
+                            <p:childTnLst>
+                              <p:par>
+                                <p:cTn id="9" presetID="1" presetClass="entr" presetSubtype="0" fill="hold" grpId="0" nodeType="clickEffect">
+                                  <p:stCondLst>
+                                    <p:cond delay="0"/>
+                                  </p:stCondLst>
+                                  <p:childTnLst>
+                                    <p:set>
+                                      <p:cBhvr>
+                                        <p:cTn id="10" dur="1" fill="hold">
+                                          <p:stCondLst>
+                                            <p:cond delay="0"/>
+                                          </p:stCondLst>
+                                        </p:cTn>
+                                        <p:tgtEl>
+                                          <p:spTgt spid="6"/>
+                                        </p:tgtEl>
+                                        <p:attrNameLst>
+                                          <p:attrName>style.visibility</p:attrName>
+                                        </p:attrNameLst>
+                                      </p:cBhvr>
+                                      <p:to>
+                                        <p:strVal val="visible"/>
+                                      </p:to>
+                                    </p:set>
+                                  </p:childTnLst>
+                                </p:cTn>
+                              </p:par>
+                            </p:childTnLst>
+                          </p:cTn>
+                        </p:par>
+                      </p:childTnLst>
+                    </p:cTn>
+                  </p:par>
+                  <p:par>
+                    <p:cTn id="11" fill="hold">
+                      <p:stCondLst>
+                        <p:cond delay="indefinite"/>
+                      </p:stCondLst>
+                      <p:childTnLst>
+                        <p:par>
+                          <p:cTn id="12" fill="hold">
+                            <p:stCondLst>
+                              <p:cond delay="0"/>
+                            </p:stCondLst>
+                            <p:childTnLst>
+                              <p:par>
+                                <p:cTn id="13" presetID="1" presetClass="entr" presetSubtype="0" fill="hold" grpId="0" nodeType="clickEffect">
+                                  <p:stCondLst>
+                                    <p:cond delay="0"/>
+                                  </p:stCondLst>
+                                  <p:childTnLst>
+                                    <p:set>
+                                      <p:cBhvr>
+                                        <p:cTn id="14" dur="1" fill="hold">
+                                          <p:stCondLst>
+                                            <p:cond delay="0"/>
+                                          </p:stCondLst>
+                                        </p:cTn>
+                                        <p:tgtEl>
+                                          <p:spTgt spid="10"/>
+                                        </p:tgtEl>
+                                        <p:attrNameLst>
+                                          <p:attrName>style.visibility</p:attrName>
+                                        </p:attrNameLst>
+                                      </p:cBhvr>
+                                      <p:to>
+                                        <p:strVal val="visible"/>
+                                      </p:to>
+                                    </p:set>
+                                  </p:childTnLst>
+                                </p:cTn>
+                              </p:par>
+                            </p:childTnLst>
+                          </p:cTn>
+                        </p:par>
+                      </p:childTnLst>
+                    </p:cTn>
+                  </p:par>
+                  <p:par>
+                    <p:cTn id="15" fill="hold">
+                      <p:stCondLst>
+                        <p:cond delay="indefinite"/>
+                      </p:stCondLst>
+                      <p:childTnLst>
+                        <p:par>
+                          <p:cTn id="16" fill="hold">
+                            <p:stCondLst>
+                              <p:cond delay="0"/>
+                            </p:stCondLst>
+                            <p:childTnLst>
+                              <p:par>
+                                <p:cTn id="17" presetID="1" presetClass="exit" presetSubtype="0" fill="hold" grpId="1" nodeType="clickEffect">
+                                  <p:stCondLst>
+                                    <p:cond delay="0"/>
+                                  </p:stCondLst>
+                                  <p:childTnLst>
+                                    <p:set>
+                                      <p:cBhvr>
+                                        <p:cTn id="18" dur="1" fill="hold">
+                                          <p:stCondLst>
+                                            <p:cond delay="0"/>
+                                          </p:stCondLst>
+                                        </p:cTn>
+                                        <p:tgtEl>
+                                          <p:spTgt spid="10"/>
+                                        </p:tgtEl>
+                                        <p:attrNameLst>
+                                          <p:attrName>style.visibility</p:attrName>
+                                        </p:attrNameLst>
+                                      </p:cBhvr>
+                                      <p:to>
+                                        <p:strVal val="hidden"/>
+                                      </p:to>
+                                    </p:set>
+                                  </p:childTnLst>
+                                </p:cTn>
+                              </p:par>
+                            </p:childTnLst>
+                          </p:cTn>
+                        </p:par>
+                      </p:childTnLst>
+                    </p:cTn>
+                  </p:par>
+                  <p:par>
+                    <p:cTn id="19" fill="hold">
+                      <p:stCondLst>
+                        <p:cond delay="indefinite"/>
+                      </p:stCondLst>
+                      <p:childTnLst>
+                        <p:par>
+                          <p:cTn id="20" fill="hold">
+                            <p:stCondLst>
+                              <p:cond delay="0"/>
+                            </p:stCondLst>
+                            <p:childTnLst>
+                              <p:par>
+                                <p:cTn id="21" presetID="1" presetClass="entr" presetSubtype="0" fill="hold" grpId="0" nodeType="clickEffect">
+                                  <p:stCondLst>
+                                    <p:cond delay="0"/>
+                                  </p:stCondLst>
+                                  <p:childTnLst>
+                                    <p:set>
+                                      <p:cBhvr>
+                                        <p:cTn id="22" dur="1" fill="hold">
+                                          <p:stCondLst>
+                                            <p:cond delay="0"/>
+                                          </p:stCondLst>
+                                        </p:cTn>
+                                        <p:tgtEl>
+                                          <p:spTgt spid="5"/>
+                                        </p:tgtEl>
+                                        <p:attrNameLst>
+                                          <p:attrName>style.visibility</p:attrName>
+                                        </p:attrNameLst>
+                                      </p:cBhvr>
+                                      <p:to>
+                                        <p:strVal val="visible"/>
+                                      </p:to>
+                                    </p:set>
+                                  </p:childTnLst>
+                                </p:cTn>
+                              </p:par>
+                            </p:childTnLst>
+                          </p:cTn>
+                        </p:par>
+                      </p:childTnLst>
+                    </p:cTn>
+                  </p:par>
+                </p:childTnLst>
+              </p:cTn>
+              <p:prevCondLst>
+                <p:cond evt="onPrev" delay="0">
+                  <p:tgtEl>
+                    <p:sldTgt/>
+                  </p:tgtEl>
+                </p:cond>
+              </p:prevCondLst>
+              <p:nextCondLst>
+                <p:cond evt="onNext" delay="0">
+                  <p:tgtEl>
+                    <p:sldTgt/>
+                  </p:tgtEl>
+                </p:cond>
+              </p:nextCondLst>
+            </p:seq>
+          </p:childTnLst>
+        </p:cTn>
+      </p:par>
+    </p:tnLst>
+    <p:bldLst>
+      <p:bldP spid="10" grpId="0" animBg="1"/>
+      <p:bldP spid="10" grpId="1" animBg="1"/>
+      <p:bldP spid="5" grpId="0" animBg="1"/>
+      <p:bldP spid="6" grpId="0" animBg="1"/>
+      <p:bldP spid="7" grpId="1" animBg="1"/>
+    </p:bldLst>
+  </p:timing>
+</p:sld>
+</file>
+
+<file path=ppt/slides/slide7.xml><?xml version="1.0" encoding="utf-8"?>
+<p:sld xmlns:a="http://schemas.openxmlformats.org/drawingml/2006/main" xmlns:r="http://schemas.openxmlformats.org/officeDocument/2006/relationships" xmlns:p="http://schemas.openxmlformats.org/presentationml/2006/main">
+  <p:cSld>
+    <p:spTree>
+      <p:nvGrpSpPr>
+        <p:cNvPr id="1" name=""/>
+        <p:cNvGrpSpPr/>
+        <p:nvPr/>
+      </p:nvGrpSpPr>
+      <p:grpSpPr>
+        <a:xfrm>
+          <a:off x="0" y="0"/>
+          <a:ext cx="0" cy="0"/>
+          <a:chOff x="0" y="0"/>
+          <a:chExt cx="0" cy="0"/>
+        </a:xfrm>
+      </p:grpSpPr>
+      <p:sp>
+        <p:nvSpPr>
+          <p:cNvPr id="2" name="Title 1"/>
+          <p:cNvSpPr>
+            <a:spLocks noGrp="1"/>
+          </p:cNvSpPr>
+          <p:nvPr>
+            <p:ph type="title"/>
+          </p:nvPr>
+        </p:nvSpPr>
+        <p:spPr/>
+        <p:txBody>
+          <a:bodyPr/>
+          <a:lstStyle/>
+          <a:p>
+            <a:r>
+              <a:rPr lang="en-US" dirty="0" smtClean="0"/>
+              <a:t>DNS Basics</a:t>
+            </a:r>
+            <a:endParaRPr lang="en-US" dirty="0"/>
+          </a:p>
+        </p:txBody>
+      </p:sp>
+      <p:sp>
+        <p:nvSpPr>
+          <p:cNvPr id="4" name="TextBox 3"/>
+          <p:cNvSpPr txBox="1"/>
+          <p:nvPr/>
+        </p:nvSpPr>
+        <p:spPr>
+          <a:xfrm>
+            <a:off x="9906000" y="-1"/>
+            <a:ext cx="2286000" cy="2031325"/>
+          </a:xfrm>
+          <a:prstGeom prst="rect">
+            <a:avLst/>
+          </a:prstGeom>
+          <a:solidFill>
+            <a:srgbClr val="FFFF00"/>
+          </a:solidFill>
+          <a:ln>
+            <a:noFill/>
+          </a:ln>
+        </p:spPr>
+        <p:txBody>
+          <a:bodyPr wrap="square" rtlCol="0">
+            <a:spAutoFit/>
+          </a:bodyPr>
+          <a:lstStyle/>
+          <a:p>
+            <a:pPr algn="ctr"/>
+            <a:endParaRPr lang="en-US" dirty="0" smtClean="0"/>
+          </a:p>
+          <a:p>
+            <a:pPr algn="ctr"/>
+            <a:endParaRPr lang="en-US" dirty="0"/>
+          </a:p>
+          <a:p>
+            <a:pPr algn="ctr"/>
+            <a:r>
+              <a:rPr lang="en-US" dirty="0" smtClean="0"/>
+              <a:t>Please leave this area blank to allow for picture in picture recording</a:t>
+            </a:r>
+          </a:p>
+          <a:p>
+            <a:pPr algn="ctr"/>
+            <a:endParaRPr lang="en-US" dirty="0"/>
+          </a:p>
+        </p:txBody>
+      </p:sp>
+      <p:sp>
+        <p:nvSpPr>
+          <p:cNvPr id="8" name="TextBox 7"/>
+          <p:cNvSpPr txBox="1"/>
+          <p:nvPr/>
+        </p:nvSpPr>
+        <p:spPr>
+          <a:xfrm>
+            <a:off x="1943144" y="2009957"/>
+            <a:ext cx="8397171" cy="1107996"/>
+          </a:xfrm>
+          <a:prstGeom prst="rect">
+            <a:avLst/>
+          </a:prstGeom>
+          <a:noFill/>
+        </p:spPr>
+        <p:txBody>
+          <a:bodyPr wrap="none" rtlCol="0">
+            <a:spAutoFit/>
+          </a:bodyPr>
+          <a:lstStyle/>
+          <a:p>
+            <a:r>
+              <a:rPr lang="en-US" sz="6600" dirty="0" smtClean="0"/>
+              <a:t>jon.imagenomnom.com</a:t>
+            </a:r>
+            <a:endParaRPr lang="en-US" sz="6600" dirty="0"/>
+          </a:p>
+        </p:txBody>
+      </p:sp>
+      <p:sp>
+        <p:nvSpPr>
+          <p:cNvPr id="9" name="TextBox 8"/>
+          <p:cNvSpPr txBox="1"/>
+          <p:nvPr/>
+        </p:nvSpPr>
+        <p:spPr>
+          <a:xfrm>
+            <a:off x="1943143" y="3810412"/>
+            <a:ext cx="8397171" cy="1323439"/>
+          </a:xfrm>
+          <a:prstGeom prst="rect">
+            <a:avLst/>
+          </a:prstGeom>
+          <a:noFill/>
+        </p:spPr>
+        <p:txBody>
+          <a:bodyPr wrap="square" rtlCol="0">
+            <a:spAutoFit/>
+          </a:bodyPr>
+          <a:lstStyle/>
+          <a:p>
+            <a:pPr algn="ctr"/>
+            <a:r>
+              <a:rPr lang="en-US" sz="8000" b="1" dirty="0" smtClean="0"/>
+              <a:t>40.112.142.148</a:t>
+            </a:r>
+            <a:endParaRPr lang="en-US" sz="8000" b="1" dirty="0"/>
+          </a:p>
+        </p:txBody>
+      </p:sp>
+    </p:spTree>
+    <p:extLst>
+      <p:ext uri="{BB962C8B-B14F-4D97-AF65-F5344CB8AC3E}">
+        <p14:creationId xmlns:p14="http://schemas.microsoft.com/office/powerpoint/2010/main" val="532832231"/>
+      </p:ext>
+    </p:extLst>
+  </p:cSld>
+  <p:clrMapOvr>
+    <a:masterClrMapping/>
+  </p:clrMapOvr>
+  <p:timing>
+    <p:tnLst>
+      <p:par>
+        <p:cTn id="1" dur="indefinite" restart="never" nodeType="tmRoot">
+          <p:childTnLst>
+            <p:seq concurrent="1" nextAc="seek">
+              <p:cTn id="2" dur="indefinite" nodeType="mainSeq">
+                <p:childTnLst>
+                  <p:par>
+                    <p:cTn id="3" fill="hold">
+                      <p:stCondLst>
+                        <p:cond delay="indefinite"/>
+                      </p:stCondLst>
+                      <p:childTnLst>
+                        <p:par>
+                          <p:cTn id="4" fill="hold">
+                            <p:stCondLst>
+                              <p:cond delay="0"/>
+                            </p:stCondLst>
+                            <p:childTnLst>
+                              <p:par>
+                                <p:cTn id="5" presetID="1" presetClass="entr" presetSubtype="0" fill="hold" grpId="0" nodeType="clickEffect">
+                                  <p:stCondLst>
+                                    <p:cond delay="0"/>
+                                  </p:stCondLst>
+                                  <p:childTnLst>
+                                    <p:set>
+                                      <p:cBhvr>
+                                        <p:cTn id="6" dur="1" fill="hold">
+                                          <p:stCondLst>
+                                            <p:cond delay="0"/>
+                                          </p:stCondLst>
+                                        </p:cTn>
+                                        <p:tgtEl>
+                                          <p:spTgt spid="9"/>
+                                        </p:tgtEl>
+                                        <p:attrNameLst>
+                                          <p:attrName>style.visibility</p:attrName>
+                                        </p:attrNameLst>
+                                      </p:cBhvr>
+                                      <p:to>
+                                        <p:strVal val="visible"/>
+                                      </p:to>
+                                    </p:set>
+                                  </p:childTnLst>
+                                </p:cTn>
+                              </p:par>
+                            </p:childTnLst>
+                          </p:cTn>
+                        </p:par>
+                      </p:childTnLst>
+                    </p:cTn>
+                  </p:par>
+                </p:childTnLst>
+              </p:cTn>
+              <p:prevCondLst>
+                <p:cond evt="onPrev" delay="0">
+                  <p:tgtEl>
+                    <p:sldTgt/>
+                  </p:tgtEl>
+                </p:cond>
+              </p:prevCondLst>
+              <p:nextCondLst>
+                <p:cond evt="onNext" delay="0">
+                  <p:tgtEl>
+                    <p:sldTgt/>
+                  </p:tgtEl>
+                </p:cond>
+              </p:nextCondLst>
+            </p:seq>
+          </p:childTnLst>
+        </p:cTn>
+      </p:par>
+    </p:tnLst>
+    <p:bldLst>
+      <p:bldP spid="9" grpId="0"/>
+    </p:bldLst>
+  </p:timing>
+</p:sld>
+</file>
+
+<file path=ppt/slides/slide8.xml><?xml version="1.0" encoding="utf-8"?>
+<p:sld xmlns:a="http://schemas.openxmlformats.org/drawingml/2006/main" xmlns:r="http://schemas.openxmlformats.org/officeDocument/2006/relationships" xmlns:p="http://schemas.openxmlformats.org/presentationml/2006/main">
+  <p:cSld>
+    <p:spTree>
+      <p:nvGrpSpPr>
+        <p:cNvPr id="1" name=""/>
+        <p:cNvGrpSpPr/>
+        <p:nvPr/>
+      </p:nvGrpSpPr>
+      <p:grpSpPr>
+        <a:xfrm>
+          <a:off x="0" y="0"/>
+          <a:ext cx="0" cy="0"/>
+          <a:chOff x="0" y="0"/>
+          <a:chExt cx="0" cy="0"/>
+        </a:xfrm>
+      </p:grpSpPr>
+      <p:sp>
+        <p:nvSpPr>
+          <p:cNvPr id="2" name="Title 1"/>
+          <p:cNvSpPr>
+            <a:spLocks noGrp="1"/>
+          </p:cNvSpPr>
+          <p:nvPr>
+            <p:ph type="title"/>
+          </p:nvPr>
+        </p:nvSpPr>
+        <p:spPr/>
+        <p:txBody>
+          <a:bodyPr/>
+          <a:lstStyle/>
+          <a:p>
+            <a:r>
+              <a:rPr lang="en-US" dirty="0" smtClean="0"/>
+              <a:t>Configuring DNS</a:t>
+            </a:r>
+            <a:endParaRPr lang="en-US" dirty="0"/>
+          </a:p>
+        </p:txBody>
+      </p:sp>
+      <p:sp>
+        <p:nvSpPr>
+          <p:cNvPr id="4" name="TextBox 3"/>
+          <p:cNvSpPr txBox="1"/>
+          <p:nvPr/>
+        </p:nvSpPr>
+        <p:spPr>
+          <a:xfrm>
+            <a:off x="9906000" y="-1"/>
+            <a:ext cx="2286000" cy="2031325"/>
+          </a:xfrm>
+          <a:prstGeom prst="rect">
+            <a:avLst/>
+          </a:prstGeom>
+          <a:solidFill>
+            <a:srgbClr val="FFFF00"/>
+          </a:solidFill>
+          <a:ln>
+            <a:noFill/>
+          </a:ln>
+        </p:spPr>
+        <p:txBody>
+          <a:bodyPr wrap="square" rtlCol="0">
+            <a:spAutoFit/>
+          </a:bodyPr>
+          <a:lstStyle/>
+          <a:p>
+            <a:pPr algn="ctr"/>
+            <a:endParaRPr lang="en-US" dirty="0" smtClean="0"/>
+          </a:p>
+          <a:p>
+            <a:pPr algn="ctr"/>
+            <a:endParaRPr lang="en-US" dirty="0"/>
+          </a:p>
+          <a:p>
+            <a:pPr algn="ctr"/>
+            <a:r>
+              <a:rPr lang="en-US" dirty="0" smtClean="0"/>
+              <a:t>Please leave this area blank to allow for picture in picture recording</a:t>
+            </a:r>
+          </a:p>
+          <a:p>
+            <a:pPr algn="ctr"/>
+            <a:endParaRPr lang="en-US" dirty="0"/>
+          </a:p>
+        </p:txBody>
+      </p:sp>
+      <p:sp>
+        <p:nvSpPr>
+          <p:cNvPr id="5" name="Content Placeholder 6"/>
+          <p:cNvSpPr>
+            <a:spLocks noGrp="1"/>
+          </p:cNvSpPr>
+          <p:nvPr>
+            <p:ph sz="quarter" idx="10"/>
+          </p:nvPr>
+        </p:nvSpPr>
+        <p:spPr>
+          <a:xfrm>
+            <a:off x="379413" y="1388226"/>
+            <a:ext cx="11525250" cy="5290388"/>
+          </a:xfrm>
+        </p:spPr>
+        <p:txBody>
+          <a:bodyPr>
+            <a:normAutofit/>
+          </a:bodyPr>
+          <a:lstStyle/>
+          <a:p>
+            <a:r>
+              <a:rPr lang="en-GB" dirty="0" smtClean="0"/>
+              <a:t>Register a domain</a:t>
+            </a:r>
+          </a:p>
+          <a:p>
+            <a:r>
+              <a:rPr lang="en-GB" dirty="0" smtClean="0"/>
+              <a:t>Delegate name resolution</a:t>
+            </a:r>
+          </a:p>
+          <a:p>
+            <a:r>
+              <a:rPr lang="en-GB" dirty="0" smtClean="0"/>
+              <a:t>Create requisite records</a:t>
+            </a:r>
+          </a:p>
+        </p:txBody>
+      </p:sp>
+    </p:spTree>
+    <p:extLst>
+      <p:ext uri="{BB962C8B-B14F-4D97-AF65-F5344CB8AC3E}">
+        <p14:creationId xmlns:p14="http://schemas.microsoft.com/office/powerpoint/2010/main" val="2516532076"/>
+      </p:ext>
+    </p:extLst>
+  </p:cSld>
+  <p:clrMapOvr>
+    <a:masterClrMapping/>
+  </p:clrMapOvr>
+  <p:timing>
+    <p:tnLst>
+      <p:par>
+        <p:cTn id="1" dur="indefinite" restart="never" nodeType="tmRoot">
+          <p:childTnLst>
+            <p:seq concurrent="1" nextAc="seek">
+              <p:cTn id="2" dur="indefinite" nodeType="mainSeq">
+                <p:childTnLst>
+                  <p:par>
+                    <p:cTn id="3" fill="hold">
+                      <p:stCondLst>
+                        <p:cond delay="indefinite"/>
+                      </p:stCondLst>
+                      <p:childTnLst>
+                        <p:par>
+                          <p:cTn id="4" fill="hold">
+                            <p:stCondLst>
+                              <p:cond delay="0"/>
+                            </p:stCondLst>
+                            <p:childTnLst>
+                              <p:par>
+                                <p:cTn id="5" presetID="1" presetClass="entr" presetSubtype="0" fill="hold" nodeType="clickEffect">
+                                  <p:stCondLst>
+                                    <p:cond delay="0"/>
+                                  </p:stCondLst>
+                                  <p:childTnLst>
+                                    <p:set>
+                                      <p:cBhvr>
+                                        <p:cTn id="6" dur="1" fill="hold">
+                                          <p:stCondLst>
+                                            <p:cond delay="0"/>
+                                          </p:stCondLst>
+                                        </p:cTn>
+                                        <p:tgtEl>
+                                          <p:spTgt spid="5">
+                                            <p:txEl>
+                                              <p:pRg st="0" end="0"/>
+                                            </p:txEl>
+                                          </p:spTgt>
+                                        </p:tgtEl>
+                                        <p:attrNameLst>
+                                          <p:attrName>style.visibility</p:attrName>
+                                        </p:attrNameLst>
+                                      </p:cBhvr>
+                                      <p:to>
+                                        <p:strVal val="visible"/>
+                                      </p:to>
+                                    </p:set>
+                                  </p:childTnLst>
+                                </p:cTn>
+                              </p:par>
+                            </p:childTnLst>
+                          </p:cTn>
+                        </p:par>
+                      </p:childTnLst>
+                    </p:cTn>
+                  </p:par>
+                  <p:par>
+                    <p:cTn id="7" fill="hold">
+                      <p:stCondLst>
+                        <p:cond delay="indefinite"/>
+                      </p:stCondLst>
+                      <p:childTnLst>
+                        <p:par>
+                          <p:cTn id="8" fill="hold">
+                            <p:stCondLst>
+                              <p:cond delay="0"/>
+                            </p:stCondLst>
+                            <p:childTnLst>
+                              <p:par>
+                                <p:cTn id="9" presetID="1" presetClass="entr" presetSubtype="0" fill="hold" nodeType="clickEffect">
+                                  <p:stCondLst>
+                                    <p:cond delay="0"/>
+                                  </p:stCondLst>
+                                  <p:childTnLst>
+                                    <p:set>
+                                      <p:cBhvr>
+                                        <p:cTn id="10" dur="1" fill="hold">
+                                          <p:stCondLst>
+                                            <p:cond delay="0"/>
+                                          </p:stCondLst>
+                                        </p:cTn>
+                                        <p:tgtEl>
+                                          <p:spTgt spid="5">
+                                            <p:txEl>
+                                              <p:pRg st="1" end="1"/>
+                                            </p:txEl>
+                                          </p:spTgt>
+                                        </p:tgtEl>
+                                        <p:attrNameLst>
+                                          <p:attrName>style.visibility</p:attrName>
+                                        </p:attrNameLst>
+                                      </p:cBhvr>
+                                      <p:to>
+                                        <p:strVal val="visible"/>
+                                      </p:to>
+                                    </p:set>
+                                  </p:childTnLst>
+                                </p:cTn>
+                              </p:par>
+                            </p:childTnLst>
+                          </p:cTn>
+                        </p:par>
+                      </p:childTnLst>
+                    </p:cTn>
+                  </p:par>
+                  <p:par>
+                    <p:cTn id="11" fill="hold">
+                      <p:stCondLst>
+                        <p:cond delay="indefinite"/>
+                      </p:stCondLst>
+                      <p:childTnLst>
+                        <p:par>
+                          <p:cTn id="12" fill="hold">
+                            <p:stCondLst>
+                              <p:cond delay="0"/>
+                            </p:stCondLst>
+                            <p:childTnLst>
+                              <p:par>
+                                <p:cTn id="13" presetID="1" presetClass="entr" presetSubtype="0" fill="hold" nodeType="clickEffect">
+                                  <p:stCondLst>
+                                    <p:cond delay="0"/>
+                                  </p:stCondLst>
+                                  <p:childTnLst>
+                                    <p:set>
+                                      <p:cBhvr>
+                                        <p:cTn id="14" dur="1" fill="hold">
+                                          <p:stCondLst>
+                                            <p:cond delay="0"/>
+                                          </p:stCondLst>
+                                        </p:cTn>
+                                        <p:tgtEl>
+                                          <p:spTgt spid="5">
+                                            <p:txEl>
+                                              <p:pRg st="2" end="2"/>
+                                            </p:txEl>
+                                          </p:spTgt>
+                                        </p:tgtEl>
+                                        <p:attrNameLst>
+                                          <p:attrName>style.visibility</p:attrName>
+                                        </p:attrNameLst>
+                                      </p:cBhvr>
+                                      <p:to>
+                                        <p:strVal val="visible"/>
+                                      </p:to>
+                                    </p:set>
+                                  </p:childTnLst>
+                                </p:cTn>
+                              </p:par>
+                            </p:childTnLst>
+                          </p:cTn>
+                        </p:par>
+                      </p:childTnLst>
+                    </p:cTn>
+                  </p:par>
+                </p:childTnLst>
+              </p:cTn>
+              <p:prevCondLst>
+                <p:cond evt="onPrev" delay="0">
+                  <p:tgtEl>
+                    <p:sldTgt/>
+                  </p:tgtEl>
+                </p:cond>
+              </p:prevCondLst>
+              <p:nextCondLst>
+                <p:cond evt="onNext" delay="0">
+                  <p:tgtEl>
+                    <p:sldTgt/>
+                  </p:tgtEl>
+                </p:cond>
+              </p:nextCondLst>
+            </p:seq>
+          </p:childTnLst>
+        </p:cTn>
+      </p:par>
+    </p:tnLst>
+  </p:timing>
+</p:sld>
+</file>
+
+<file path=ppt/slides/slide9.xml><?xml version="1.0" encoding="utf-8"?>
+<p:sld xmlns:a="http://schemas.openxmlformats.org/drawingml/2006/main" xmlns:r="http://schemas.openxmlformats.org/officeDocument/2006/relationships" xmlns:p="http://schemas.openxmlformats.org/presentationml/2006/main">
+  <p:cSld>
+    <p:spTree>
+      <p:nvGrpSpPr>
+        <p:cNvPr id="1" name=""/>
+        <p:cNvGrpSpPr/>
+        <p:nvPr/>
+      </p:nvGrpSpPr>
+      <p:grpSpPr>
+        <a:xfrm>
+          <a:off x="0" y="0"/>
+          <a:ext cx="0" cy="0"/>
+          <a:chOff x="0" y="0"/>
+          <a:chExt cx="0" cy="0"/>
+        </a:xfrm>
+      </p:grpSpPr>
+      <p:sp>
+        <p:nvSpPr>
+          <p:cNvPr id="2" name="Title 1"/>
+          <p:cNvSpPr>
+            <a:spLocks noGrp="1"/>
+          </p:cNvSpPr>
+          <p:nvPr>
+            <p:ph type="title"/>
+          </p:nvPr>
+        </p:nvSpPr>
+        <p:spPr/>
+        <p:txBody>
+          <a:bodyPr/>
+          <a:lstStyle/>
+          <a:p>
+            <a:r>
+              <a:rPr lang="en-US" dirty="0" smtClean="0"/>
+              <a:t>Name Resolution</a:t>
+            </a:r>
+            <a:endParaRPr lang="en-US" dirty="0"/>
+          </a:p>
+        </p:txBody>
+      </p:sp>
+      <p:sp>
+        <p:nvSpPr>
+          <p:cNvPr id="4" name="TextBox 3"/>
+          <p:cNvSpPr txBox="1"/>
+          <p:nvPr/>
+        </p:nvSpPr>
+        <p:spPr>
+          <a:xfrm>
+            <a:off x="9906000" y="-1"/>
+            <a:ext cx="2286000" cy="2031325"/>
+          </a:xfrm>
+          <a:prstGeom prst="rect">
+            <a:avLst/>
+          </a:prstGeom>
+          <a:solidFill>
+            <a:srgbClr val="FFFF00"/>
+          </a:solidFill>
+          <a:ln>
+            <a:noFill/>
+          </a:ln>
+        </p:spPr>
+        <p:txBody>
+          <a:bodyPr wrap="square" rtlCol="0">
+            <a:spAutoFit/>
+          </a:bodyPr>
+          <a:lstStyle/>
+          <a:p>
+            <a:pPr algn="ctr"/>
+            <a:endParaRPr lang="en-US" dirty="0" smtClean="0"/>
+          </a:p>
+          <a:p>
+            <a:pPr algn="ctr"/>
+            <a:endParaRPr lang="en-US" dirty="0"/>
+          </a:p>
+          <a:p>
+            <a:pPr algn="ctr"/>
+            <a:r>
+              <a:rPr lang="en-US" dirty="0" smtClean="0"/>
+              <a:t>Please leave this area blank to allow for picture in picture recording</a:t>
+            </a:r>
+          </a:p>
+          <a:p>
+            <a:pPr algn="ctr"/>
+            <a:endParaRPr lang="en-US" dirty="0"/>
+          </a:p>
+        </p:txBody>
+      </p:sp>
+      <p:pic>
+        <p:nvPicPr>
+          <p:cNvPr id="5" name="Picture 4"/>
+          <p:cNvPicPr>
+            <a:picLocks noChangeAspect="1"/>
+          </p:cNvPicPr>
+          <p:nvPr/>
+        </p:nvPicPr>
+        <p:blipFill>
+          <a:blip r:embed="rId3"/>
+          <a:stretch>
+            <a:fillRect/>
+          </a:stretch>
+        </p:blipFill>
+        <p:spPr>
+          <a:xfrm>
+            <a:off x="1980746" y="1676626"/>
+            <a:ext cx="6953250" cy="2924175"/>
+          </a:xfrm>
+          <a:prstGeom prst="rect">
+            <a:avLst/>
+          </a:prstGeom>
+        </p:spPr>
+      </p:pic>
+    </p:spTree>
+    <p:extLst>
+      <p:ext uri="{BB962C8B-B14F-4D97-AF65-F5344CB8AC3E}">
+        <p14:creationId xmlns:p14="http://schemas.microsoft.com/office/powerpoint/2010/main" val="628566823"/>
       </p:ext>
     </p:extLst>
   </p:cSld>
@@ -4858,12 +9052,46 @@
 </file>
 
 <file path=customXml/item1.xml><?xml version="1.0" encoding="utf-8"?>
-<?mso-contentType ?>
-<FormTemplates xmlns="http://schemas.microsoft.com/sharepoint/v3/contenttype/forms">
-  <Display>DocumentLibraryForm</Display>
-  <Edit>DocumentLibraryForm</Edit>
-  <New>DocumentLibraryForm</New>
-</FormTemplates>
+<p:properties xmlns:p="http://schemas.microsoft.com/office/2006/metadata/properties" xmlns:xsi="http://www.w3.org/2001/XMLSchema-instance" xmlns:pc="http://schemas.microsoft.com/office/infopath/2007/PartnerControls">
+  <documentManagement>
+    <TaxCatchAll xmlns="230e9df3-be65-4c73-a93b-d1236ebd677e"/>
+    <PublishingExpirationDate xmlns="http://schemas.microsoft.com/sharepoint/v3" xsi:nil="true"/>
+    <PublishingStartDate xmlns="http://schemas.microsoft.com/sharepoint/v3" xsi:nil="true"/>
+    <TaxKeywordTaxHTField xmlns="230e9df3-be65-4c73-a93b-d1236ebd677e">
+      <Terms xmlns="http://schemas.microsoft.com/office/infopath/2007/PartnerControls"/>
+    </TaxKeywordTaxHTField>
+    <SharedWithUsers xmlns="27aa9422-7f1f-4c84-9cdf-302b1a67e513">
+      <UserInfo>
+        <DisplayName>Shriram Natarajan (SHRI)</DisplayName>
+        <AccountId>3899</AccountId>
+        <AccountType/>
+      </UserInfo>
+      <UserInfo>
+        <DisplayName>Andrew Nickels</DisplayName>
+        <AccountId>24014</AccountId>
+        <AccountType/>
+      </UserInfo>
+      <UserInfo>
+        <DisplayName>Steven Goddard (WSSC)</DisplayName>
+        <AccountId>29711</AccountId>
+        <AccountType/>
+      </UserInfo>
+      <UserInfo>
+        <DisplayName>Jim Clark (LEARNING)</DisplayName>
+        <AccountId>86</AccountId>
+        <AccountType/>
+      </UserInfo>
+      <UserInfo>
+        <DisplayName>Vijay Kumar</DisplayName>
+        <AccountId>53758</AccountId>
+        <AccountType/>
+      </UserInfo>
+    </SharedWithUsers>
+    <SharingHintHash xmlns="27aa9422-7f1f-4c84-9cdf-302b1a67e513">1366665793</SharingHintHash>
+    <_ip_UnifiedCompliancePolicyUIAction xmlns="http://schemas.microsoft.com/sharepoint/v3" xsi:nil="true"/>
+    <_ip_UnifiedCompliancePolicyProperties xmlns="http://schemas.microsoft.com/sharepoint/v3" xsi:nil="true"/>
+  </documentManagement>
+</p:properties>
 </file>
 
 <file path=customXml/item2.xml><?xml version="1.0" encoding="utf-8"?>
@@ -5075,52 +9303,28 @@
 </file>
 
 <file path=customXml/item3.xml><?xml version="1.0" encoding="utf-8"?>
-<p:properties xmlns:p="http://schemas.microsoft.com/office/2006/metadata/properties" xmlns:xsi="http://www.w3.org/2001/XMLSchema-instance" xmlns:pc="http://schemas.microsoft.com/office/infopath/2007/PartnerControls">
-  <documentManagement>
-    <TaxCatchAll xmlns="230e9df3-be65-4c73-a93b-d1236ebd677e"/>
-    <PublishingExpirationDate xmlns="http://schemas.microsoft.com/sharepoint/v3" xsi:nil="true"/>
-    <PublishingStartDate xmlns="http://schemas.microsoft.com/sharepoint/v3" xsi:nil="true"/>
-    <TaxKeywordTaxHTField xmlns="230e9df3-be65-4c73-a93b-d1236ebd677e">
-      <Terms xmlns="http://schemas.microsoft.com/office/infopath/2007/PartnerControls"/>
-    </TaxKeywordTaxHTField>
-    <SharedWithUsers xmlns="27aa9422-7f1f-4c84-9cdf-302b1a67e513">
-      <UserInfo>
-        <DisplayName>Shriram Natarajan (SHRI)</DisplayName>
-        <AccountId>3899</AccountId>
-        <AccountType/>
-      </UserInfo>
-      <UserInfo>
-        <DisplayName>Andrew Nickels</DisplayName>
-        <AccountId>24014</AccountId>
-        <AccountType/>
-      </UserInfo>
-      <UserInfo>
-        <DisplayName>Steven Goddard (WSSC)</DisplayName>
-        <AccountId>29711</AccountId>
-        <AccountType/>
-      </UserInfo>
-      <UserInfo>
-        <DisplayName>Jim Clark (LEARNING)</DisplayName>
-        <AccountId>86</AccountId>
-        <AccountType/>
-      </UserInfo>
-      <UserInfo>
-        <DisplayName>Vijay Kumar</DisplayName>
-        <AccountId>53758</AccountId>
-        <AccountType/>
-      </UserInfo>
-    </SharedWithUsers>
-    <SharingHintHash xmlns="27aa9422-7f1f-4c84-9cdf-302b1a67e513">1366665793</SharingHintHash>
-    <_ip_UnifiedCompliancePolicyUIAction xmlns="http://schemas.microsoft.com/sharepoint/v3" xsi:nil="true"/>
-    <_ip_UnifiedCompliancePolicyProperties xmlns="http://schemas.microsoft.com/sharepoint/v3" xsi:nil="true"/>
-  </documentManagement>
-</p:properties>
+<?mso-contentType ?>
+<FormTemplates xmlns="http://schemas.microsoft.com/sharepoint/v3/contenttype/forms">
+  <Display>DocumentLibraryForm</Display>
+  <Edit>DocumentLibraryForm</Edit>
+  <New>DocumentLibraryForm</New>
+</FormTemplates>
 </file>
 
 <file path=customXml/itemProps1.xml><?xml version="1.0" encoding="utf-8"?>
-<ds:datastoreItem xmlns:ds="http://schemas.openxmlformats.org/officeDocument/2006/customXml" ds:itemID="{B0CA13EC-1D3C-4D6F-8D1C-E8A452CFC79A}">
+<ds:datastoreItem xmlns:ds="http://schemas.openxmlformats.org/officeDocument/2006/customXml" ds:itemID="{7025FDD9-4C58-4084-9F89-0E6ADD6FFF55}">
   <ds:schemaRefs>
-    <ds:schemaRef ds:uri="http://schemas.microsoft.com/sharepoint/v3/contenttype/forms"/>
+    <ds:schemaRef ds:uri="http://purl.org/dc/dcmitype/"/>
+    <ds:schemaRef ds:uri="http://schemas.microsoft.com/sharepoint/v3"/>
+    <ds:schemaRef ds:uri="http://purl.org/dc/elements/1.1/"/>
+    <ds:schemaRef ds:uri="http://schemas.microsoft.com/office/2006/metadata/properties"/>
+    <ds:schemaRef ds:uri="http://www.w3.org/XML/1998/namespace"/>
+    <ds:schemaRef ds:uri="http://purl.org/dc/terms/"/>
+    <ds:schemaRef ds:uri="27aa9422-7f1f-4c84-9cdf-302b1a67e513"/>
+    <ds:schemaRef ds:uri="http://schemas.microsoft.com/office/2006/documentManagement/types"/>
+    <ds:schemaRef ds:uri="http://schemas.microsoft.com/office/infopath/2007/PartnerControls"/>
+    <ds:schemaRef ds:uri="http://schemas.openxmlformats.org/package/2006/metadata/core-properties"/>
+    <ds:schemaRef ds:uri="230e9df3-be65-4c73-a93b-d1236ebd677e"/>
   </ds:schemaRefs>
 </ds:datastoreItem>
 </file>
@@ -5146,19 +9350,9 @@
 </file>
 
 <file path=customXml/itemProps3.xml><?xml version="1.0" encoding="utf-8"?>
-<ds:datastoreItem xmlns:ds="http://schemas.openxmlformats.org/officeDocument/2006/customXml" ds:itemID="{7025FDD9-4C58-4084-9F89-0E6ADD6FFF55}">
+<ds:datastoreItem xmlns:ds="http://schemas.openxmlformats.org/officeDocument/2006/customXml" ds:itemID="{B0CA13EC-1D3C-4D6F-8D1C-E8A452CFC79A}">
   <ds:schemaRefs>
-    <ds:schemaRef ds:uri="http://schemas.microsoft.com/sharepoint/v3"/>
-    <ds:schemaRef ds:uri="http://schemas.openxmlformats.org/package/2006/metadata/core-properties"/>
-    <ds:schemaRef ds:uri="http://purl.org/dc/elements/1.1/"/>
-    <ds:schemaRef ds:uri="http://purl.org/dc/dcmitype/"/>
-    <ds:schemaRef ds:uri="http://schemas.microsoft.com/office/2006/metadata/properties"/>
-    <ds:schemaRef ds:uri="http://schemas.microsoft.com/office/infopath/2007/PartnerControls"/>
-    <ds:schemaRef ds:uri="http://purl.org/dc/terms/"/>
-    <ds:schemaRef ds:uri="http://schemas.microsoft.com/office/2006/documentManagement/types"/>
-    <ds:schemaRef ds:uri="http://www.w3.org/XML/1998/namespace"/>
-    <ds:schemaRef ds:uri="27aa9422-7f1f-4c84-9cdf-302b1a67e513"/>
-    <ds:schemaRef ds:uri="230e9df3-be65-4c73-a93b-d1236ebd677e"/>
+    <ds:schemaRef ds:uri="http://schemas.microsoft.com/sharepoint/v3/contenttype/forms"/>
   </ds:schemaRefs>
 </ds:datastoreItem>
 </file>
</xml_diff>